<commit_message>
Update GitHub e Version Control.pptx
</commit_message>
<xml_diff>
--- a/GitHub e Version Control.pptx
+++ b/GitHub e Version Control.pptx
@@ -4,6 +4,9 @@
   <p:sldMasterIdLst>
     <p:sldMasterId id="2147483648" r:id="rId1"/>
   </p:sldMasterIdLst>
+  <p:notesMasterIdLst>
+    <p:notesMasterId r:id="rId12"/>
+  </p:notesMasterIdLst>
   <p:sldIdLst>
     <p:sldId id="256" r:id="rId2"/>
     <p:sldId id="257" r:id="rId3"/>
@@ -12,6 +15,9 @@
     <p:sldId id="260" r:id="rId6"/>
     <p:sldId id="261" r:id="rId7"/>
     <p:sldId id="262" r:id="rId8"/>
+    <p:sldId id="263" r:id="rId9"/>
+    <p:sldId id="264" r:id="rId10"/>
+    <p:sldId id="265" r:id="rId11"/>
   </p:sldIdLst>
   <p:sldSz cx="12192000" cy="6858000"/>
   <p:notesSz cx="6858000" cy="9144000"/>
@@ -177,6 +183,21 @@
       <pc:docMk/>
       <pc:sldMk cId="437974755" sldId="259"/>
     </pc:sldMkLst>
+    <p188:replyLst>
+      <p188:reply id="{E42B622A-B708-4DB5-9CD4-A13FA967930E}" authorId="{E564D443-8AEA-97A7-4717-363B3234E7A1}" created="2025-09-07T17:06:41.534">
+        <p188:txBody>
+          <a:bodyPr/>
+          <a:lstStyle/>
+          <a:p>
+            <a:r>
+              <a:rPr lang="en-CH"/>
+              <a:t>Il branching è la possibilità di creare una ramificazione del progetto
+Il merging è l’operazione con cui le modifiche fatte in un branch vengono integrate in un altro branch</a:t>
+            </a:r>
+          </a:p>
+        </p188:txBody>
+      </p188:reply>
+    </p188:replyLst>
     <p188:txBody>
       <a:bodyPr/>
       <a:lstStyle/>
@@ -231,6 +252,525 @@
     </p188:txBody>
   </p188:cm>
 </p188:cmLst>
+</file>
+
+<file path=ppt/comments/modernComment_106_A8048647.xml><?xml version="1.0" encoding="utf-8"?>
+<p188:cmLst xmlns:a="http://schemas.openxmlformats.org/drawingml/2006/main" xmlns:r="http://schemas.openxmlformats.org/officeDocument/2006/relationships" xmlns:p188="http://schemas.microsoft.com/office/powerpoint/2018/8/main">
+  <p188:cm id="{CBFA5371-1A28-4ADA-96C1-A70FBF18778C}" authorId="{E564D443-8AEA-97A7-4717-363B3234E7A1}" created="2025-09-07T17:19:13.980">
+    <pc:sldMkLst xmlns:pc="http://schemas.microsoft.com/office/powerpoint/2013/main/command">
+      <pc:docMk/>
+      <pc:sldMk cId="2818868807" sldId="262"/>
+    </pc:sldMkLst>
+    <p188:txBody>
+      <a:bodyPr/>
+      <a:lstStyle/>
+      <a:p>
+        <a:r>
+          <a:rPr lang="en-CH"/>
+          <a:t>permette a ogni sviluppatore di avere una copia completa del repository, compresa l’intera cronologia delle modifiche</a:t>
+        </a:r>
+      </a:p>
+    </p188:txBody>
+  </p188:cm>
+  <p188:cm id="{4E0ED8FF-C661-48E2-BF33-B9DC1011CF6A}" authorId="{E564D443-8AEA-97A7-4717-363B3234E7A1}" created="2025-09-07T17:23:23.982">
+    <ac:deMkLst xmlns:ac="http://schemas.microsoft.com/office/drawing/2013/main/command">
+      <pc:docMk xmlns:pc="http://schemas.microsoft.com/office/powerpoint/2013/main/command"/>
+      <pc:sldMk xmlns:pc="http://schemas.microsoft.com/office/powerpoint/2013/main/command" cId="2818868807" sldId="262"/>
+      <ac:spMk id="3" creationId="{1FBFF35C-79E4-14BC-7190-48E3D298A3FB}"/>
+    </ac:deMkLst>
+    <p188:txBody>
+      <a:bodyPr/>
+      <a:lstStyle/>
+      <a:p>
+        <a:r>
+          <a:rPr lang="en-CH"/>
+          <a:t>La sua forza principale è la gestione dei branch, che consente di lavorare in parallelo su nuove funzionalità o correzioni senza compromettere il codice stabile, per poi integrare il tutto tramite il merge</a:t>
+        </a:r>
+      </a:p>
+    </p188:txBody>
+  </p188:cm>
+</p188:cmLst>
+</file>
+
+<file path=ppt/comments/modernComment_107_32FE2A52.xml><?xml version="1.0" encoding="utf-8"?>
+<p188:cmLst xmlns:a="http://schemas.openxmlformats.org/drawingml/2006/main" xmlns:r="http://schemas.openxmlformats.org/officeDocument/2006/relationships" xmlns:p188="http://schemas.microsoft.com/office/powerpoint/2018/8/main">
+  <p188:cm id="{6C7C0221-F887-4FB1-83D8-1C7497734014}" authorId="{E564D443-8AEA-97A7-4717-363B3234E7A1}" created="2025-09-07T17:41:42.617">
+    <ac:deMkLst xmlns:ac="http://schemas.microsoft.com/office/drawing/2013/main/command">
+      <pc:docMk xmlns:pc="http://schemas.microsoft.com/office/powerpoint/2013/main/command"/>
+      <pc:sldMk xmlns:pc="http://schemas.microsoft.com/office/powerpoint/2013/main/command" cId="855517778" sldId="263"/>
+      <ac:spMk id="3" creationId="{D15F5099-84ED-F4EA-34FE-05057D0E36C5}"/>
+    </ac:deMkLst>
+    <p188:txBody>
+      <a:bodyPr/>
+      <a:lstStyle/>
+      <a:p>
+        <a:r>
+          <a:rPr lang="en-CH"/>
+          <a:t>CI – Continuous Integration (Integrazione Continua)
+Ogni volta che uno sviluppatore fa modifiche al codice e le carica sul repository, la piattaforma le testa automaticamente
+Continuous Delivery / Continuous Deployment (Consegna/Distribuzione Continua)
+Continuous Delivery: il codice testato può essere preparato per la produzione in modo automatico, ma un essere umano decide quando rilasciarlo.
+Continuous Deployment: il codice testato viene rilasciato automaticamente in produzione senza intervento umano.</a:t>
+        </a:r>
+      </a:p>
+    </p188:txBody>
+  </p188:cm>
+</p188:cmLst>
+</file>
+
+<file path=ppt/comments/modernComment_108_9F4457A1.xml><?xml version="1.0" encoding="utf-8"?>
+<p188:cmLst xmlns:a="http://schemas.openxmlformats.org/drawingml/2006/main" xmlns:r="http://schemas.openxmlformats.org/officeDocument/2006/relationships" xmlns:p188="http://schemas.microsoft.com/office/powerpoint/2018/8/main">
+  <p188:cm id="{7DE10CFD-96B6-4056-A200-153C27AB42F2}" authorId="{E564D443-8AEA-97A7-4717-363B3234E7A1}" created="2025-09-07T17:54:55.244">
+    <pc:sldMkLst xmlns:pc="http://schemas.microsoft.com/office/powerpoint/2013/main/command">
+      <pc:docMk/>
+      <pc:sldMk cId="2672056225" sldId="264"/>
+    </pc:sldMkLst>
+    <p188:txBody>
+      <a:bodyPr/>
+      <a:lstStyle/>
+      <a:p>
+        <a:r>
+          <a:rPr lang="en-CH"/>
+          <a:t>Gli strumenti Atlassian sono una serie di software progettati per aiutare team e aziende a collaborare, organizzare progetti e gestire lo sviluppo software. Atlassian è l’azienda che li produce.</a:t>
+        </a:r>
+      </a:p>
+    </p188:txBody>
+  </p188:cm>
+</p188:cmLst>
+</file>
+
+<file path=ppt/notesMasters/notesMaster1.xml><?xml version="1.0" encoding="utf-8"?>
+<p:notesMaster xmlns:a="http://schemas.openxmlformats.org/drawingml/2006/main" xmlns:r="http://schemas.openxmlformats.org/officeDocument/2006/relationships" xmlns:p="http://schemas.openxmlformats.org/presentationml/2006/main">
+  <p:cSld>
+    <p:bg>
+      <p:bgRef idx="1001">
+        <a:schemeClr val="bg1"/>
+      </p:bgRef>
+    </p:bg>
+    <p:spTree>
+      <p:nvGrpSpPr>
+        <p:cNvPr id="1" name=""/>
+        <p:cNvGrpSpPr/>
+        <p:nvPr/>
+      </p:nvGrpSpPr>
+      <p:grpSpPr>
+        <a:xfrm>
+          <a:off x="0" y="0"/>
+          <a:ext cx="0" cy="0"/>
+          <a:chOff x="0" y="0"/>
+          <a:chExt cx="0" cy="0"/>
+        </a:xfrm>
+      </p:grpSpPr>
+      <p:sp>
+        <p:nvSpPr>
+          <p:cNvPr id="2" name="Espace réservé de l'en-tête 1"/>
+          <p:cNvSpPr>
+            <a:spLocks noGrp="1"/>
+          </p:cNvSpPr>
+          <p:nvPr>
+            <p:ph type="hdr" sz="quarter"/>
+          </p:nvPr>
+        </p:nvSpPr>
+        <p:spPr>
+          <a:xfrm>
+            <a:off x="0" y="0"/>
+            <a:ext cx="2971800" cy="458788"/>
+          </a:xfrm>
+          <a:prstGeom prst="rect">
+            <a:avLst/>
+          </a:prstGeom>
+        </p:spPr>
+        <p:txBody>
+          <a:bodyPr vert="horz" lIns="91440" tIns="45720" rIns="91440" bIns="45720" rtlCol="0"/>
+          <a:lstStyle>
+            <a:lvl1pPr algn="l">
+              <a:defRPr sz="1200"/>
+            </a:lvl1pPr>
+          </a:lstStyle>
+          <a:p>
+            <a:endParaRPr lang="en-CH"/>
+          </a:p>
+        </p:txBody>
+      </p:sp>
+      <p:sp>
+        <p:nvSpPr>
+          <p:cNvPr id="3" name="Espace réservé de la date 2"/>
+          <p:cNvSpPr>
+            <a:spLocks noGrp="1"/>
+          </p:cNvSpPr>
+          <p:nvPr>
+            <p:ph type="dt" idx="1"/>
+          </p:nvPr>
+        </p:nvSpPr>
+        <p:spPr>
+          <a:xfrm>
+            <a:off x="3884613" y="0"/>
+            <a:ext cx="2971800" cy="458788"/>
+          </a:xfrm>
+          <a:prstGeom prst="rect">
+            <a:avLst/>
+          </a:prstGeom>
+        </p:spPr>
+        <p:txBody>
+          <a:bodyPr vert="horz" lIns="91440" tIns="45720" rIns="91440" bIns="45720" rtlCol="0"/>
+          <a:lstStyle>
+            <a:lvl1pPr algn="r">
+              <a:defRPr sz="1200"/>
+            </a:lvl1pPr>
+          </a:lstStyle>
+          <a:p>
+            <a:fld id="{B5C153CE-4FF1-467C-AB3A-486A34885718}" type="datetimeFigureOut">
+              <a:rPr lang="en-CH" smtClean="0"/>
+              <a:t>07.09.2025</a:t>
+            </a:fld>
+            <a:endParaRPr lang="en-CH"/>
+          </a:p>
+        </p:txBody>
+      </p:sp>
+      <p:sp>
+        <p:nvSpPr>
+          <p:cNvPr id="4" name="Espace réservé de l'image des diapositives 3"/>
+          <p:cNvSpPr>
+            <a:spLocks noGrp="1" noRot="1" noChangeAspect="1"/>
+          </p:cNvSpPr>
+          <p:nvPr>
+            <p:ph type="sldImg" idx="2"/>
+          </p:nvPr>
+        </p:nvSpPr>
+        <p:spPr>
+          <a:xfrm>
+            <a:off x="685800" y="1143000"/>
+            <a:ext cx="5486400" cy="3086100"/>
+          </a:xfrm>
+          <a:prstGeom prst="rect">
+            <a:avLst/>
+          </a:prstGeom>
+          <a:noFill/>
+          <a:ln w="12700">
+            <a:solidFill>
+              <a:prstClr val="black"/>
+            </a:solidFill>
+          </a:ln>
+        </p:spPr>
+        <p:txBody>
+          <a:bodyPr vert="horz" lIns="91440" tIns="45720" rIns="91440" bIns="45720" rtlCol="0" anchor="ctr"/>
+          <a:lstStyle/>
+          <a:p>
+            <a:endParaRPr lang="en-CH"/>
+          </a:p>
+        </p:txBody>
+      </p:sp>
+      <p:sp>
+        <p:nvSpPr>
+          <p:cNvPr id="5" name="Espace réservé des notes 4"/>
+          <p:cNvSpPr>
+            <a:spLocks noGrp="1"/>
+          </p:cNvSpPr>
+          <p:nvPr>
+            <p:ph type="body" sz="quarter" idx="3"/>
+          </p:nvPr>
+        </p:nvSpPr>
+        <p:spPr>
+          <a:xfrm>
+            <a:off x="685800" y="4400550"/>
+            <a:ext cx="5486400" cy="3600450"/>
+          </a:xfrm>
+          <a:prstGeom prst="rect">
+            <a:avLst/>
+          </a:prstGeom>
+        </p:spPr>
+        <p:txBody>
+          <a:bodyPr vert="horz" lIns="91440" tIns="45720" rIns="91440" bIns="45720" rtlCol="0"/>
+          <a:lstStyle/>
+          <a:p>
+            <a:pPr lvl="0"/>
+            <a:r>
+              <a:rPr lang="fr-FR"/>
+              <a:t>Cliquez pour modifier les styles du texte du masque</a:t>
+            </a:r>
+          </a:p>
+          <a:p>
+            <a:pPr lvl="1"/>
+            <a:r>
+              <a:rPr lang="fr-FR"/>
+              <a:t>Deuxième niveau</a:t>
+            </a:r>
+          </a:p>
+          <a:p>
+            <a:pPr lvl="2"/>
+            <a:r>
+              <a:rPr lang="fr-FR"/>
+              <a:t>Troisième niveau</a:t>
+            </a:r>
+          </a:p>
+          <a:p>
+            <a:pPr lvl="3"/>
+            <a:r>
+              <a:rPr lang="fr-FR"/>
+              <a:t>Quatrième niveau</a:t>
+            </a:r>
+          </a:p>
+          <a:p>
+            <a:pPr lvl="4"/>
+            <a:r>
+              <a:rPr lang="fr-FR"/>
+              <a:t>Cinquième niveau</a:t>
+            </a:r>
+            <a:endParaRPr lang="en-CH"/>
+          </a:p>
+        </p:txBody>
+      </p:sp>
+      <p:sp>
+        <p:nvSpPr>
+          <p:cNvPr id="6" name="Espace réservé du pied de page 5"/>
+          <p:cNvSpPr>
+            <a:spLocks noGrp="1"/>
+          </p:cNvSpPr>
+          <p:nvPr>
+            <p:ph type="ftr" sz="quarter" idx="4"/>
+          </p:nvPr>
+        </p:nvSpPr>
+        <p:spPr>
+          <a:xfrm>
+            <a:off x="0" y="8685213"/>
+            <a:ext cx="2971800" cy="458787"/>
+          </a:xfrm>
+          <a:prstGeom prst="rect">
+            <a:avLst/>
+          </a:prstGeom>
+        </p:spPr>
+        <p:txBody>
+          <a:bodyPr vert="horz" lIns="91440" tIns="45720" rIns="91440" bIns="45720" rtlCol="0" anchor="b"/>
+          <a:lstStyle>
+            <a:lvl1pPr algn="l">
+              <a:defRPr sz="1200"/>
+            </a:lvl1pPr>
+          </a:lstStyle>
+          <a:p>
+            <a:endParaRPr lang="en-CH"/>
+          </a:p>
+        </p:txBody>
+      </p:sp>
+      <p:sp>
+        <p:nvSpPr>
+          <p:cNvPr id="7" name="Espace réservé du numéro de diapositive 6"/>
+          <p:cNvSpPr>
+            <a:spLocks noGrp="1"/>
+          </p:cNvSpPr>
+          <p:nvPr>
+            <p:ph type="sldNum" sz="quarter" idx="5"/>
+          </p:nvPr>
+        </p:nvSpPr>
+        <p:spPr>
+          <a:xfrm>
+            <a:off x="3884613" y="8685213"/>
+            <a:ext cx="2971800" cy="458787"/>
+          </a:xfrm>
+          <a:prstGeom prst="rect">
+            <a:avLst/>
+          </a:prstGeom>
+        </p:spPr>
+        <p:txBody>
+          <a:bodyPr vert="horz" lIns="91440" tIns="45720" rIns="91440" bIns="45720" rtlCol="0" anchor="b"/>
+          <a:lstStyle>
+            <a:lvl1pPr algn="r">
+              <a:defRPr sz="1200"/>
+            </a:lvl1pPr>
+          </a:lstStyle>
+          <a:p>
+            <a:fld id="{8997022C-C85F-47C3-AA0A-322A3C891B2E}" type="slidenum">
+              <a:rPr lang="en-CH" smtClean="0"/>
+              <a:t>‹N°›</a:t>
+            </a:fld>
+            <a:endParaRPr lang="en-CH"/>
+          </a:p>
+        </p:txBody>
+      </p:sp>
+    </p:spTree>
+    <p:extLst>
+      <p:ext uri="{BB962C8B-B14F-4D97-AF65-F5344CB8AC3E}">
+        <p14:creationId xmlns:p14="http://schemas.microsoft.com/office/powerpoint/2010/main" val="382826106"/>
+      </p:ext>
+    </p:extLst>
+  </p:cSld>
+  <p:clrMap bg1="lt1" tx1="dk1" bg2="lt2" tx2="dk2" accent1="accent1" accent2="accent2" accent3="accent3" accent4="accent4" accent5="accent5" accent6="accent6" hlink="hlink" folHlink="folHlink"/>
+  <p:notesStyle>
+    <a:lvl1pPr marL="0" algn="l" defTabSz="914400" rtl="0" eaLnBrk="1" latinLnBrk="0" hangingPunct="1">
+      <a:defRPr sz="1200" kern="1200">
+        <a:solidFill>
+          <a:schemeClr val="tx1"/>
+        </a:solidFill>
+        <a:latin typeface="+mn-lt"/>
+        <a:ea typeface="+mn-ea"/>
+        <a:cs typeface="+mn-cs"/>
+      </a:defRPr>
+    </a:lvl1pPr>
+    <a:lvl2pPr marL="457200" algn="l" defTabSz="914400" rtl="0" eaLnBrk="1" latinLnBrk="0" hangingPunct="1">
+      <a:defRPr sz="1200" kern="1200">
+        <a:solidFill>
+          <a:schemeClr val="tx1"/>
+        </a:solidFill>
+        <a:latin typeface="+mn-lt"/>
+        <a:ea typeface="+mn-ea"/>
+        <a:cs typeface="+mn-cs"/>
+      </a:defRPr>
+    </a:lvl2pPr>
+    <a:lvl3pPr marL="914400" algn="l" defTabSz="914400" rtl="0" eaLnBrk="1" latinLnBrk="0" hangingPunct="1">
+      <a:defRPr sz="1200" kern="1200">
+        <a:solidFill>
+          <a:schemeClr val="tx1"/>
+        </a:solidFill>
+        <a:latin typeface="+mn-lt"/>
+        <a:ea typeface="+mn-ea"/>
+        <a:cs typeface="+mn-cs"/>
+      </a:defRPr>
+    </a:lvl3pPr>
+    <a:lvl4pPr marL="1371600" algn="l" defTabSz="914400" rtl="0" eaLnBrk="1" latinLnBrk="0" hangingPunct="1">
+      <a:defRPr sz="1200" kern="1200">
+        <a:solidFill>
+          <a:schemeClr val="tx1"/>
+        </a:solidFill>
+        <a:latin typeface="+mn-lt"/>
+        <a:ea typeface="+mn-ea"/>
+        <a:cs typeface="+mn-cs"/>
+      </a:defRPr>
+    </a:lvl4pPr>
+    <a:lvl5pPr marL="1828800" algn="l" defTabSz="914400" rtl="0" eaLnBrk="1" latinLnBrk="0" hangingPunct="1">
+      <a:defRPr sz="1200" kern="1200">
+        <a:solidFill>
+          <a:schemeClr val="tx1"/>
+        </a:solidFill>
+        <a:latin typeface="+mn-lt"/>
+        <a:ea typeface="+mn-ea"/>
+        <a:cs typeface="+mn-cs"/>
+      </a:defRPr>
+    </a:lvl5pPr>
+    <a:lvl6pPr marL="2286000" algn="l" defTabSz="914400" rtl="0" eaLnBrk="1" latinLnBrk="0" hangingPunct="1">
+      <a:defRPr sz="1200" kern="1200">
+        <a:solidFill>
+          <a:schemeClr val="tx1"/>
+        </a:solidFill>
+        <a:latin typeface="+mn-lt"/>
+        <a:ea typeface="+mn-ea"/>
+        <a:cs typeface="+mn-cs"/>
+      </a:defRPr>
+    </a:lvl6pPr>
+    <a:lvl7pPr marL="2743200" algn="l" defTabSz="914400" rtl="0" eaLnBrk="1" latinLnBrk="0" hangingPunct="1">
+      <a:defRPr sz="1200" kern="1200">
+        <a:solidFill>
+          <a:schemeClr val="tx1"/>
+        </a:solidFill>
+        <a:latin typeface="+mn-lt"/>
+        <a:ea typeface="+mn-ea"/>
+        <a:cs typeface="+mn-cs"/>
+      </a:defRPr>
+    </a:lvl7pPr>
+    <a:lvl8pPr marL="3200400" algn="l" defTabSz="914400" rtl="0" eaLnBrk="1" latinLnBrk="0" hangingPunct="1">
+      <a:defRPr sz="1200" kern="1200">
+        <a:solidFill>
+          <a:schemeClr val="tx1"/>
+        </a:solidFill>
+        <a:latin typeface="+mn-lt"/>
+        <a:ea typeface="+mn-ea"/>
+        <a:cs typeface="+mn-cs"/>
+      </a:defRPr>
+    </a:lvl8pPr>
+    <a:lvl9pPr marL="3657600" algn="l" defTabSz="914400" rtl="0" eaLnBrk="1" latinLnBrk="0" hangingPunct="1">
+      <a:defRPr sz="1200" kern="1200">
+        <a:solidFill>
+          <a:schemeClr val="tx1"/>
+        </a:solidFill>
+        <a:latin typeface="+mn-lt"/>
+        <a:ea typeface="+mn-ea"/>
+        <a:cs typeface="+mn-cs"/>
+      </a:defRPr>
+    </a:lvl9pPr>
+  </p:notesStyle>
+</p:notesMaster>
+</file>
+
+<file path=ppt/notesSlides/notesSlide1.xml><?xml version="1.0" encoding="utf-8"?>
+<p:notes xmlns:a="http://schemas.openxmlformats.org/drawingml/2006/main" xmlns:r="http://schemas.openxmlformats.org/officeDocument/2006/relationships" xmlns:p="http://schemas.openxmlformats.org/presentationml/2006/main">
+  <p:cSld>
+    <p:spTree>
+      <p:nvGrpSpPr>
+        <p:cNvPr id="1" name=""/>
+        <p:cNvGrpSpPr/>
+        <p:nvPr/>
+      </p:nvGrpSpPr>
+      <p:grpSpPr>
+        <a:xfrm>
+          <a:off x="0" y="0"/>
+          <a:ext cx="0" cy="0"/>
+          <a:chOff x="0" y="0"/>
+          <a:chExt cx="0" cy="0"/>
+        </a:xfrm>
+      </p:grpSpPr>
+      <p:sp>
+        <p:nvSpPr>
+          <p:cNvPr id="2" name="Espace réservé de l'image des diapositives 1"/>
+          <p:cNvSpPr>
+            <a:spLocks noGrp="1" noRot="1" noChangeAspect="1"/>
+          </p:cNvSpPr>
+          <p:nvPr>
+            <p:ph type="sldImg"/>
+          </p:nvPr>
+        </p:nvSpPr>
+        <p:spPr/>
+      </p:sp>
+      <p:sp>
+        <p:nvSpPr>
+          <p:cNvPr id="3" name="Espace réservé des notes 2"/>
+          <p:cNvSpPr>
+            <a:spLocks noGrp="1"/>
+          </p:cNvSpPr>
+          <p:nvPr>
+            <p:ph type="body" idx="1"/>
+          </p:nvPr>
+        </p:nvSpPr>
+        <p:spPr/>
+        <p:txBody>
+          <a:bodyPr/>
+          <a:lstStyle/>
+          <a:p>
+            <a:endParaRPr lang="en-CH"/>
+          </a:p>
+        </p:txBody>
+      </p:sp>
+      <p:sp>
+        <p:nvSpPr>
+          <p:cNvPr id="4" name="Espace réservé du numéro de diapositive 3"/>
+          <p:cNvSpPr>
+            <a:spLocks noGrp="1"/>
+          </p:cNvSpPr>
+          <p:nvPr>
+            <p:ph type="sldNum" sz="quarter" idx="5"/>
+          </p:nvPr>
+        </p:nvSpPr>
+        <p:spPr/>
+        <p:txBody>
+          <a:bodyPr/>
+          <a:lstStyle/>
+          <a:p>
+            <a:fld id="{8997022C-C85F-47C3-AA0A-322A3C891B2E}" type="slidenum">
+              <a:rPr lang="en-CH" smtClean="0"/>
+              <a:t>7</a:t>
+            </a:fld>
+            <a:endParaRPr lang="en-CH"/>
+          </a:p>
+        </p:txBody>
+      </p:sp>
+    </p:spTree>
+    <p:extLst>
+      <p:ext uri="{BB962C8B-B14F-4D97-AF65-F5344CB8AC3E}">
+        <p14:creationId xmlns:p14="http://schemas.microsoft.com/office/powerpoint/2010/main" val="470715440"/>
+      </p:ext>
+    </p:extLst>
+  </p:cSld>
+  <p:clrMapOvr>
+    <a:masterClrMapping/>
+  </p:clrMapOvr>
+</p:notes>
 </file>
 
 <file path=ppt/slideLayouts/slideLayout1.xml><?xml version="1.0" encoding="utf-8"?>
@@ -4605,6 +5145,338 @@
 </p:sld>
 </file>
 
+<file path=ppt/slides/slide10.xml><?xml version="1.0" encoding="utf-8"?>
+<p:sld xmlns:a="http://schemas.openxmlformats.org/drawingml/2006/main" xmlns:r="http://schemas.openxmlformats.org/officeDocument/2006/relationships" xmlns:p="http://schemas.openxmlformats.org/presentationml/2006/main">
+  <p:cSld>
+    <p:bg>
+      <p:bgPr>
+        <a:solidFill>
+          <a:schemeClr val="bg1"/>
+        </a:solidFill>
+        <a:effectLst/>
+      </p:bgPr>
+    </p:bg>
+    <p:spTree>
+      <p:nvGrpSpPr>
+        <p:cNvPr id="1" name=""/>
+        <p:cNvGrpSpPr/>
+        <p:nvPr/>
+      </p:nvGrpSpPr>
+      <p:grpSpPr>
+        <a:xfrm>
+          <a:off x="0" y="0"/>
+          <a:ext cx="0" cy="0"/>
+          <a:chOff x="0" y="0"/>
+          <a:chExt cx="0" cy="0"/>
+        </a:xfrm>
+      </p:grpSpPr>
+      <p:sp useBgFill="1">
+        <p:nvSpPr>
+          <p:cNvPr id="9" name="Rectangle 8">
+            <a:extLst>
+              <a:ext uri="{FF2B5EF4-FFF2-40B4-BE49-F238E27FC236}">
+                <a16:creationId xmlns:a16="http://schemas.microsoft.com/office/drawing/2014/main" id="{5AA03EDC-7067-4DFF-B672-541D016AAAB8}"/>
+              </a:ext>
+              <a:ext uri="{C183D7F6-B498-43B3-948B-1728B52AA6E4}">
+                <adec:decorative xmlns:adec="http://schemas.microsoft.com/office/drawing/2017/decorative" val="1"/>
+              </a:ext>
+            </a:extLst>
+          </p:cNvPr>
+          <p:cNvSpPr>
+            <a:spLocks noGrp="1" noRot="1" noChangeAspect="1" noMove="1" noResize="1" noEditPoints="1" noAdjustHandles="1" noChangeArrowheads="1" noChangeShapeType="1" noTextEdit="1"/>
+          </p:cNvSpPr>
+          <p:nvPr>
+            <p:extLst>
+              <p:ext uri="{386F3935-93C4-4BCD-93E2-E3B085C9AB24}">
+                <p16:designElem xmlns:p16="http://schemas.microsoft.com/office/powerpoint/2015/main" val="1"/>
+              </p:ext>
+            </p:extLst>
+          </p:nvPr>
+        </p:nvSpPr>
+        <p:spPr>
+          <a:xfrm>
+            <a:off x="0" y="0"/>
+            <a:ext cx="12192000" cy="6858000"/>
+          </a:xfrm>
+          <a:prstGeom prst="rect">
+            <a:avLst/>
+          </a:prstGeom>
+          <a:ln w="12700" cap="flat" cmpd="sng" algn="ctr">
+            <a:noFill/>
+            <a:prstDash val="solid"/>
+            <a:miter lim="800000"/>
+          </a:ln>
+          <a:effectLst/>
+          <a:extLst>
+            <a:ext uri="{91240B29-F687-4F45-9708-019B960494DF}">
+              <a14:hiddenLine xmlns:a14="http://schemas.microsoft.com/office/drawing/2010/main" w="12700" cap="flat" cmpd="sng" algn="ctr">
+                <a:solidFill>
+                  <a:schemeClr val="accent1">
+                    <a:shade val="50000"/>
+                  </a:schemeClr>
+                </a:solidFill>
+                <a:prstDash val="solid"/>
+                <a:miter lim="800000"/>
+              </a14:hiddenLine>
+            </a:ext>
+          </a:extLst>
+        </p:spPr>
+        <p:style>
+          <a:lnRef idx="2">
+            <a:schemeClr val="accent1">
+              <a:shade val="50000"/>
+            </a:schemeClr>
+          </a:lnRef>
+          <a:fillRef idx="1">
+            <a:schemeClr val="accent1"/>
+          </a:fillRef>
+          <a:effectRef idx="0">
+            <a:schemeClr val="accent1"/>
+          </a:effectRef>
+          <a:fontRef idx="minor">
+            <a:schemeClr val="lt1"/>
+          </a:fontRef>
+        </p:style>
+        <p:txBody>
+          <a:bodyPr rtlCol="0" anchor="ctr"/>
+          <a:lstStyle/>
+          <a:p>
+            <a:pPr algn="ctr"/>
+            <a:endParaRPr lang="en-US"/>
+          </a:p>
+        </p:txBody>
+      </p:sp>
+      <p:sp>
+        <p:nvSpPr>
+          <p:cNvPr id="11" name="Rectangle 10">
+            <a:extLst>
+              <a:ext uri="{FF2B5EF4-FFF2-40B4-BE49-F238E27FC236}">
+                <a16:creationId xmlns:a16="http://schemas.microsoft.com/office/drawing/2014/main" id="{0EBF3E39-B0BE-496A-8604-9007470FFA3A}"/>
+              </a:ext>
+              <a:ext uri="{C183D7F6-B498-43B3-948B-1728B52AA6E4}">
+                <adec:decorative xmlns:adec="http://schemas.microsoft.com/office/drawing/2017/decorative" val="1"/>
+              </a:ext>
+            </a:extLst>
+          </p:cNvPr>
+          <p:cNvSpPr>
+            <a:spLocks noGrp="1" noRot="1" noChangeAspect="1" noMove="1" noResize="1" noEditPoints="1" noAdjustHandles="1" noChangeArrowheads="1" noChangeShapeType="1" noTextEdit="1"/>
+          </p:cNvSpPr>
+          <p:nvPr>
+            <p:extLst>
+              <p:ext uri="{386F3935-93C4-4BCD-93E2-E3B085C9AB24}">
+                <p16:designElem xmlns:p16="http://schemas.microsoft.com/office/powerpoint/2015/main" val="1"/>
+              </p:ext>
+            </p:extLst>
+          </p:nvPr>
+        </p:nvSpPr>
+        <p:spPr>
+          <a:xfrm>
+            <a:off x="0" y="0"/>
+            <a:ext cx="6096000" cy="6865473"/>
+          </a:xfrm>
+          <a:prstGeom prst="rect">
+            <a:avLst/>
+          </a:prstGeom>
+          <a:solidFill>
+            <a:schemeClr val="accent2">
+              <a:lumMod val="20000"/>
+              <a:lumOff val="80000"/>
+            </a:schemeClr>
+          </a:solidFill>
+          <a:ln>
+            <a:noFill/>
+          </a:ln>
+        </p:spPr>
+        <p:style>
+          <a:lnRef idx="2">
+            <a:schemeClr val="accent1">
+              <a:shade val="50000"/>
+            </a:schemeClr>
+          </a:lnRef>
+          <a:fillRef idx="1">
+            <a:schemeClr val="accent1"/>
+          </a:fillRef>
+          <a:effectRef idx="0">
+            <a:schemeClr val="accent1"/>
+          </a:effectRef>
+          <a:fontRef idx="minor">
+            <a:schemeClr val="lt1"/>
+          </a:fontRef>
+        </p:style>
+        <p:txBody>
+          <a:bodyPr rtlCol="0" anchor="ctr"/>
+          <a:lstStyle/>
+          <a:p>
+            <a:pPr algn="ctr"/>
+            <a:endParaRPr lang="en-US"/>
+          </a:p>
+        </p:txBody>
+      </p:sp>
+      <p:sp>
+        <p:nvSpPr>
+          <p:cNvPr id="2" name="Titre 1">
+            <a:extLst>
+              <a:ext uri="{FF2B5EF4-FFF2-40B4-BE49-F238E27FC236}">
+                <a16:creationId xmlns:a16="http://schemas.microsoft.com/office/drawing/2014/main" id="{5A7ADB29-1EFA-27F1-8894-4BF32CF39CA5}"/>
+              </a:ext>
+            </a:extLst>
+          </p:cNvPr>
+          <p:cNvSpPr>
+            <a:spLocks noGrp="1"/>
+          </p:cNvSpPr>
+          <p:nvPr>
+            <p:ph type="title"/>
+          </p:nvPr>
+        </p:nvSpPr>
+        <p:spPr>
+          <a:xfrm>
+            <a:off x="871442" y="685800"/>
+            <a:ext cx="4353116" cy="1474666"/>
+          </a:xfrm>
+        </p:spPr>
+        <p:txBody>
+          <a:bodyPr anchor="b">
+            <a:normAutofit/>
+          </a:bodyPr>
+          <a:lstStyle/>
+          <a:p>
+            <a:pPr algn="ctr"/>
+            <a:r>
+              <a:rPr lang="fr-FR" sz="3200">
+                <a:solidFill>
+                  <a:srgbClr val="595959"/>
+                </a:solidFill>
+              </a:rPr>
+              <a:t>Alternative-SourceForge</a:t>
+            </a:r>
+            <a:endParaRPr lang="en-CH" sz="3200">
+              <a:solidFill>
+                <a:srgbClr val="595959"/>
+              </a:solidFill>
+            </a:endParaRPr>
+          </a:p>
+        </p:txBody>
+      </p:sp>
+      <p:sp>
+        <p:nvSpPr>
+          <p:cNvPr id="3" name="Espace réservé du contenu 2">
+            <a:extLst>
+              <a:ext uri="{FF2B5EF4-FFF2-40B4-BE49-F238E27FC236}">
+                <a16:creationId xmlns:a16="http://schemas.microsoft.com/office/drawing/2014/main" id="{4DD99D0B-12D6-2BCB-C64B-AD9095B29CE6}"/>
+              </a:ext>
+            </a:extLst>
+          </p:cNvPr>
+          <p:cNvSpPr>
+            <a:spLocks noGrp="1"/>
+          </p:cNvSpPr>
+          <p:nvPr>
+            <p:ph idx="1"/>
+          </p:nvPr>
+        </p:nvSpPr>
+        <p:spPr>
+          <a:xfrm>
+            <a:off x="871442" y="2447337"/>
+            <a:ext cx="4353116" cy="3770434"/>
+          </a:xfrm>
+        </p:spPr>
+        <p:txBody>
+          <a:bodyPr anchor="t">
+            <a:normAutofit/>
+          </a:bodyPr>
+          <a:lstStyle/>
+          <a:p>
+            <a:r>
+              <a:rPr lang="it-IT" sz="2000" dirty="0">
+                <a:solidFill>
+                  <a:srgbClr val="595959"/>
+                </a:solidFill>
+              </a:rPr>
+              <a:t>piattaforma </a:t>
+            </a:r>
+            <a:r>
+              <a:rPr lang="it-IT" sz="2000" dirty="0" err="1">
+                <a:solidFill>
+                  <a:srgbClr val="595959"/>
+                </a:solidFill>
+              </a:rPr>
+              <a:t>storicha</a:t>
+            </a:r>
+            <a:endParaRPr lang="it-IT" sz="2000" dirty="0">
+              <a:solidFill>
+                <a:srgbClr val="595959"/>
+              </a:solidFill>
+            </a:endParaRPr>
+          </a:p>
+          <a:p>
+            <a:r>
+              <a:rPr lang="it-IT" sz="2000" dirty="0">
+                <a:solidFill>
+                  <a:srgbClr val="595959"/>
+                </a:solidFill>
+              </a:rPr>
+              <a:t>software libero</a:t>
+            </a:r>
+          </a:p>
+          <a:p>
+            <a:r>
+              <a:rPr lang="fr-FR" sz="2000" dirty="0">
+                <a:solidFill>
+                  <a:srgbClr val="595959"/>
+                </a:solidFill>
+              </a:rPr>
+              <a:t>Supporta repository Git, SVN e Mercurial</a:t>
+            </a:r>
+            <a:endParaRPr lang="en-CH" sz="2000" dirty="0">
+              <a:solidFill>
+                <a:srgbClr val="595959"/>
+              </a:solidFill>
+            </a:endParaRPr>
+          </a:p>
+        </p:txBody>
+      </p:sp>
+      <p:pic>
+        <p:nvPicPr>
+          <p:cNvPr id="4" name="Image 3">
+            <a:extLst>
+              <a:ext uri="{FF2B5EF4-FFF2-40B4-BE49-F238E27FC236}">
+                <a16:creationId xmlns:a16="http://schemas.microsoft.com/office/drawing/2014/main" id="{B68B1B1B-DED9-9709-687E-11AC2EA80F60}"/>
+              </a:ext>
+            </a:extLst>
+          </p:cNvPr>
+          <p:cNvPicPr>
+            <a:picLocks noChangeAspect="1"/>
+          </p:cNvPicPr>
+          <p:nvPr/>
+        </p:nvPicPr>
+        <p:blipFill>
+          <a:blip r:embed="rId2"/>
+          <a:stretch>
+            <a:fillRect/>
+          </a:stretch>
+        </p:blipFill>
+        <p:spPr>
+          <a:xfrm>
+            <a:off x="6781801" y="1879417"/>
+            <a:ext cx="4797056" cy="3144736"/>
+          </a:xfrm>
+          <a:prstGeom prst="rect">
+            <a:avLst/>
+          </a:prstGeom>
+        </p:spPr>
+      </p:pic>
+    </p:spTree>
+    <p:extLst>
+      <p:ext uri="{BB962C8B-B14F-4D97-AF65-F5344CB8AC3E}">
+        <p14:creationId xmlns:p14="http://schemas.microsoft.com/office/powerpoint/2010/main" val="1088208513"/>
+      </p:ext>
+    </p:extLst>
+  </p:cSld>
+  <p:clrMapOvr>
+    <a:masterClrMapping/>
+  </p:clrMapOvr>
+</p:sld>
+</file>
+
 <file path=ppt/slides/slide2.xml><?xml version="1.0" encoding="utf-8"?>
 <p:sld xmlns:a="http://schemas.openxmlformats.org/drawingml/2006/main" xmlns:r="http://schemas.openxmlformats.org/officeDocument/2006/relationships" xmlns:p="http://schemas.openxmlformats.org/presentationml/2006/main">
   <p:cSld>
@@ -7942,6 +8814,14 @@
 <file path=ppt/slides/slide7.xml><?xml version="1.0" encoding="utf-8"?>
 <p:sld xmlns:a="http://schemas.openxmlformats.org/drawingml/2006/main" xmlns:r="http://schemas.openxmlformats.org/officeDocument/2006/relationships" xmlns:p="http://schemas.openxmlformats.org/presentationml/2006/main">
   <p:cSld>
+    <p:bg>
+      <p:bgPr>
+        <a:solidFill>
+          <a:schemeClr val="bg1"/>
+        </a:solidFill>
+        <a:effectLst/>
+      </p:bgPr>
+    </p:bg>
     <p:spTree>
       <p:nvGrpSpPr>
         <p:cNvPr id="1" name=""/>
@@ -7956,6 +8836,66 @@
           <a:chExt cx="0" cy="0"/>
         </a:xfrm>
       </p:grpSpPr>
+      <p:sp useBgFill="1">
+        <p:nvSpPr>
+          <p:cNvPr id="8" name="Rectangle 7">
+            <a:extLst>
+              <a:ext uri="{FF2B5EF4-FFF2-40B4-BE49-F238E27FC236}">
+                <a16:creationId xmlns:a16="http://schemas.microsoft.com/office/drawing/2014/main" id="{100EDD19-6802-4EC3-95CE-CFFAB042CFD6}"/>
+              </a:ext>
+              <a:ext uri="{C183D7F6-B498-43B3-948B-1728B52AA6E4}">
+                <adec:decorative xmlns:adec="http://schemas.microsoft.com/office/drawing/2017/decorative" val="1"/>
+              </a:ext>
+            </a:extLst>
+          </p:cNvPr>
+          <p:cNvSpPr>
+            <a:spLocks noGrp="1" noRot="1" noChangeAspect="1" noMove="1" noResize="1" noEditPoints="1" noAdjustHandles="1" noChangeArrowheads="1" noChangeShapeType="1" noTextEdit="1"/>
+          </p:cNvSpPr>
+          <p:nvPr>
+            <p:extLst>
+              <p:ext uri="{386F3935-93C4-4BCD-93E2-E3B085C9AB24}">
+                <p16:designElem xmlns:p16="http://schemas.microsoft.com/office/powerpoint/2015/main" val="1"/>
+              </p:ext>
+            </p:extLst>
+          </p:nvPr>
+        </p:nvSpPr>
+        <p:spPr>
+          <a:xfrm>
+            <a:off x="0" y="0"/>
+            <a:ext cx="12188952" cy="6858000"/>
+          </a:xfrm>
+          <a:prstGeom prst="rect">
+            <a:avLst/>
+          </a:prstGeom>
+          <a:ln>
+            <a:noFill/>
+          </a:ln>
+        </p:spPr>
+        <p:style>
+          <a:lnRef idx="2">
+            <a:schemeClr val="accent1">
+              <a:shade val="50000"/>
+            </a:schemeClr>
+          </a:lnRef>
+          <a:fillRef idx="1">
+            <a:schemeClr val="accent1"/>
+          </a:fillRef>
+          <a:effectRef idx="0">
+            <a:schemeClr val="accent1"/>
+          </a:effectRef>
+          <a:fontRef idx="minor">
+            <a:schemeClr val="lt1"/>
+          </a:fontRef>
+        </p:style>
+        <p:txBody>
+          <a:bodyPr rtlCol="0" anchor="ctr"/>
+          <a:lstStyle/>
+          <a:p>
+            <a:pPr algn="ctr"/>
+            <a:endParaRPr lang="en-US"/>
+          </a:p>
+        </p:txBody>
+      </p:sp>
       <p:sp>
         <p:nvSpPr>
           <p:cNvPr id="2" name="Titre 1">
@@ -7972,17 +8912,666 @@
             <p:ph type="title"/>
           </p:nvPr>
         </p:nvSpPr>
-        <p:spPr/>
-        <p:txBody>
-          <a:bodyPr/>
+        <p:spPr>
+          <a:xfrm>
+            <a:off x="838200" y="365125"/>
+            <a:ext cx="10515600" cy="1325563"/>
+          </a:xfrm>
+        </p:spPr>
+        <p:txBody>
+          <a:bodyPr>
+            <a:normAutofit/>
+          </a:bodyPr>
           <a:lstStyle/>
           <a:p>
-            <a:endParaRPr lang="en-CH"/>
+            <a:r>
+              <a:rPr lang="fr-FR" sz="5400"/>
+              <a:t>GIT	</a:t>
+            </a:r>
+            <a:endParaRPr lang="en-CH" sz="5400"/>
           </a:p>
         </p:txBody>
       </p:sp>
       <p:sp>
         <p:nvSpPr>
+          <p:cNvPr id="10" name="sketch line">
+            <a:extLst>
+              <a:ext uri="{FF2B5EF4-FFF2-40B4-BE49-F238E27FC236}">
+                <a16:creationId xmlns:a16="http://schemas.microsoft.com/office/drawing/2014/main" id="{DB17E863-922E-4C26-BD64-E8FD41D28661}"/>
+              </a:ext>
+              <a:ext uri="{C183D7F6-B498-43B3-948B-1728B52AA6E4}">
+                <adec:decorative xmlns:adec="http://schemas.microsoft.com/office/drawing/2017/decorative" val="1"/>
+              </a:ext>
+            </a:extLst>
+          </p:cNvPr>
+          <p:cNvSpPr>
+            <a:spLocks noGrp="1" noRot="1" noChangeAspect="1" noMove="1" noResize="1" noEditPoints="1" noAdjustHandles="1" noChangeArrowheads="1" noChangeShapeType="1" noTextEdit="1"/>
+          </p:cNvSpPr>
+          <p:nvPr>
+            <p:extLst>
+              <p:ext uri="{386F3935-93C4-4BCD-93E2-E3B085C9AB24}">
+                <p16:designElem xmlns:p16="http://schemas.microsoft.com/office/powerpoint/2015/main" val="1"/>
+              </p:ext>
+            </p:extLst>
+          </p:nvPr>
+        </p:nvSpPr>
+        <p:spPr>
+          <a:xfrm>
+            <a:off x="669036" y="1677373"/>
+            <a:ext cx="10853928" cy="18288"/>
+          </a:xfrm>
+          <a:custGeom>
+            <a:avLst/>
+            <a:gdLst>
+              <a:gd name="connsiteX0" fmla="*/ 0 w 10853928"/>
+              <a:gd name="connsiteY0" fmla="*/ 0 h 18288"/>
+              <a:gd name="connsiteX1" fmla="*/ 461292 w 10853928"/>
+              <a:gd name="connsiteY1" fmla="*/ 0 h 18288"/>
+              <a:gd name="connsiteX2" fmla="*/ 1139662 w 10853928"/>
+              <a:gd name="connsiteY2" fmla="*/ 0 h 18288"/>
+              <a:gd name="connsiteX3" fmla="*/ 1926572 w 10853928"/>
+              <a:gd name="connsiteY3" fmla="*/ 0 h 18288"/>
+              <a:gd name="connsiteX4" fmla="*/ 2279325 w 10853928"/>
+              <a:gd name="connsiteY4" fmla="*/ 0 h 18288"/>
+              <a:gd name="connsiteX5" fmla="*/ 2632078 w 10853928"/>
+              <a:gd name="connsiteY5" fmla="*/ 0 h 18288"/>
+              <a:gd name="connsiteX6" fmla="*/ 3527527 w 10853928"/>
+              <a:gd name="connsiteY6" fmla="*/ 0 h 18288"/>
+              <a:gd name="connsiteX7" fmla="*/ 4205897 w 10853928"/>
+              <a:gd name="connsiteY7" fmla="*/ 0 h 18288"/>
+              <a:gd name="connsiteX8" fmla="*/ 4558650 w 10853928"/>
+              <a:gd name="connsiteY8" fmla="*/ 0 h 18288"/>
+              <a:gd name="connsiteX9" fmla="*/ 5237020 w 10853928"/>
+              <a:gd name="connsiteY9" fmla="*/ 0 h 18288"/>
+              <a:gd name="connsiteX10" fmla="*/ 6132469 w 10853928"/>
+              <a:gd name="connsiteY10" fmla="*/ 0 h 18288"/>
+              <a:gd name="connsiteX11" fmla="*/ 6702301 w 10853928"/>
+              <a:gd name="connsiteY11" fmla="*/ 0 h 18288"/>
+              <a:gd name="connsiteX12" fmla="*/ 7272132 w 10853928"/>
+              <a:gd name="connsiteY12" fmla="*/ 0 h 18288"/>
+              <a:gd name="connsiteX13" fmla="*/ 7950502 w 10853928"/>
+              <a:gd name="connsiteY13" fmla="*/ 0 h 18288"/>
+              <a:gd name="connsiteX14" fmla="*/ 8737412 w 10853928"/>
+              <a:gd name="connsiteY14" fmla="*/ 0 h 18288"/>
+              <a:gd name="connsiteX15" fmla="*/ 9524322 w 10853928"/>
+              <a:gd name="connsiteY15" fmla="*/ 0 h 18288"/>
+              <a:gd name="connsiteX16" fmla="*/ 10853928 w 10853928"/>
+              <a:gd name="connsiteY16" fmla="*/ 0 h 18288"/>
+              <a:gd name="connsiteX17" fmla="*/ 10853928 w 10853928"/>
+              <a:gd name="connsiteY17" fmla="*/ 18288 h 18288"/>
+              <a:gd name="connsiteX18" fmla="*/ 10392636 w 10853928"/>
+              <a:gd name="connsiteY18" fmla="*/ 18288 h 18288"/>
+              <a:gd name="connsiteX19" fmla="*/ 9497187 w 10853928"/>
+              <a:gd name="connsiteY19" fmla="*/ 18288 h 18288"/>
+              <a:gd name="connsiteX20" fmla="*/ 8818817 w 10853928"/>
+              <a:gd name="connsiteY20" fmla="*/ 18288 h 18288"/>
+              <a:gd name="connsiteX21" fmla="*/ 8466064 w 10853928"/>
+              <a:gd name="connsiteY21" fmla="*/ 18288 h 18288"/>
+              <a:gd name="connsiteX22" fmla="*/ 7787693 w 10853928"/>
+              <a:gd name="connsiteY22" fmla="*/ 18288 h 18288"/>
+              <a:gd name="connsiteX23" fmla="*/ 7217862 w 10853928"/>
+              <a:gd name="connsiteY23" fmla="*/ 18288 h 18288"/>
+              <a:gd name="connsiteX24" fmla="*/ 6648031 w 10853928"/>
+              <a:gd name="connsiteY24" fmla="*/ 18288 h 18288"/>
+              <a:gd name="connsiteX25" fmla="*/ 6078200 w 10853928"/>
+              <a:gd name="connsiteY25" fmla="*/ 18288 h 18288"/>
+              <a:gd name="connsiteX26" fmla="*/ 5508368 w 10853928"/>
+              <a:gd name="connsiteY26" fmla="*/ 18288 h 18288"/>
+              <a:gd name="connsiteX27" fmla="*/ 4721459 w 10853928"/>
+              <a:gd name="connsiteY27" fmla="*/ 18288 h 18288"/>
+              <a:gd name="connsiteX28" fmla="*/ 4043088 w 10853928"/>
+              <a:gd name="connsiteY28" fmla="*/ 18288 h 18288"/>
+              <a:gd name="connsiteX29" fmla="*/ 3690336 w 10853928"/>
+              <a:gd name="connsiteY29" fmla="*/ 18288 h 18288"/>
+              <a:gd name="connsiteX30" fmla="*/ 3120504 w 10853928"/>
+              <a:gd name="connsiteY30" fmla="*/ 18288 h 18288"/>
+              <a:gd name="connsiteX31" fmla="*/ 2333595 w 10853928"/>
+              <a:gd name="connsiteY31" fmla="*/ 18288 h 18288"/>
+              <a:gd name="connsiteX32" fmla="*/ 1872303 w 10853928"/>
+              <a:gd name="connsiteY32" fmla="*/ 18288 h 18288"/>
+              <a:gd name="connsiteX33" fmla="*/ 976854 w 10853928"/>
+              <a:gd name="connsiteY33" fmla="*/ 18288 h 18288"/>
+              <a:gd name="connsiteX34" fmla="*/ 0 w 10853928"/>
+              <a:gd name="connsiteY34" fmla="*/ 18288 h 18288"/>
+              <a:gd name="connsiteX35" fmla="*/ 0 w 10853928"/>
+              <a:gd name="connsiteY35" fmla="*/ 0 h 18288"/>
+            </a:gdLst>
+            <a:ahLst/>
+            <a:cxnLst>
+              <a:cxn ang="0">
+                <a:pos x="connsiteX0" y="connsiteY0"/>
+              </a:cxn>
+              <a:cxn ang="0">
+                <a:pos x="connsiteX1" y="connsiteY1"/>
+              </a:cxn>
+              <a:cxn ang="0">
+                <a:pos x="connsiteX2" y="connsiteY2"/>
+              </a:cxn>
+              <a:cxn ang="0">
+                <a:pos x="connsiteX3" y="connsiteY3"/>
+              </a:cxn>
+              <a:cxn ang="0">
+                <a:pos x="connsiteX4" y="connsiteY4"/>
+              </a:cxn>
+              <a:cxn ang="0">
+                <a:pos x="connsiteX5" y="connsiteY5"/>
+              </a:cxn>
+              <a:cxn ang="0">
+                <a:pos x="connsiteX6" y="connsiteY6"/>
+              </a:cxn>
+              <a:cxn ang="0">
+                <a:pos x="connsiteX7" y="connsiteY7"/>
+              </a:cxn>
+              <a:cxn ang="0">
+                <a:pos x="connsiteX8" y="connsiteY8"/>
+              </a:cxn>
+              <a:cxn ang="0">
+                <a:pos x="connsiteX9" y="connsiteY9"/>
+              </a:cxn>
+              <a:cxn ang="0">
+                <a:pos x="connsiteX10" y="connsiteY10"/>
+              </a:cxn>
+              <a:cxn ang="0">
+                <a:pos x="connsiteX11" y="connsiteY11"/>
+              </a:cxn>
+              <a:cxn ang="0">
+                <a:pos x="connsiteX12" y="connsiteY12"/>
+              </a:cxn>
+              <a:cxn ang="0">
+                <a:pos x="connsiteX13" y="connsiteY13"/>
+              </a:cxn>
+              <a:cxn ang="0">
+                <a:pos x="connsiteX14" y="connsiteY14"/>
+              </a:cxn>
+              <a:cxn ang="0">
+                <a:pos x="connsiteX15" y="connsiteY15"/>
+              </a:cxn>
+              <a:cxn ang="0">
+                <a:pos x="connsiteX16" y="connsiteY16"/>
+              </a:cxn>
+              <a:cxn ang="0">
+                <a:pos x="connsiteX17" y="connsiteY17"/>
+              </a:cxn>
+              <a:cxn ang="0">
+                <a:pos x="connsiteX18" y="connsiteY18"/>
+              </a:cxn>
+              <a:cxn ang="0">
+                <a:pos x="connsiteX19" y="connsiteY19"/>
+              </a:cxn>
+              <a:cxn ang="0">
+                <a:pos x="connsiteX20" y="connsiteY20"/>
+              </a:cxn>
+              <a:cxn ang="0">
+                <a:pos x="connsiteX21" y="connsiteY21"/>
+              </a:cxn>
+              <a:cxn ang="0">
+                <a:pos x="connsiteX22" y="connsiteY22"/>
+              </a:cxn>
+              <a:cxn ang="0">
+                <a:pos x="connsiteX23" y="connsiteY23"/>
+              </a:cxn>
+              <a:cxn ang="0">
+                <a:pos x="connsiteX24" y="connsiteY24"/>
+              </a:cxn>
+              <a:cxn ang="0">
+                <a:pos x="connsiteX25" y="connsiteY25"/>
+              </a:cxn>
+              <a:cxn ang="0">
+                <a:pos x="connsiteX26" y="connsiteY26"/>
+              </a:cxn>
+              <a:cxn ang="0">
+                <a:pos x="connsiteX27" y="connsiteY27"/>
+              </a:cxn>
+              <a:cxn ang="0">
+                <a:pos x="connsiteX28" y="connsiteY28"/>
+              </a:cxn>
+              <a:cxn ang="0">
+                <a:pos x="connsiteX29" y="connsiteY29"/>
+              </a:cxn>
+              <a:cxn ang="0">
+                <a:pos x="connsiteX30" y="connsiteY30"/>
+              </a:cxn>
+              <a:cxn ang="0">
+                <a:pos x="connsiteX31" y="connsiteY31"/>
+              </a:cxn>
+              <a:cxn ang="0">
+                <a:pos x="connsiteX32" y="connsiteY32"/>
+              </a:cxn>
+              <a:cxn ang="0">
+                <a:pos x="connsiteX33" y="connsiteY33"/>
+              </a:cxn>
+              <a:cxn ang="0">
+                <a:pos x="connsiteX34" y="connsiteY34"/>
+              </a:cxn>
+              <a:cxn ang="0">
+                <a:pos x="connsiteX35" y="connsiteY35"/>
+              </a:cxn>
+            </a:cxnLst>
+            <a:rect l="l" t="t" r="r" b="b"/>
+            <a:pathLst>
+              <a:path w="10853928" h="18288" fill="none" extrusionOk="0">
+                <a:moveTo>
+                  <a:pt x="0" y="0"/>
+                </a:moveTo>
+                <a:cubicBezTo>
+                  <a:pt x="146993" y="-19076"/>
+                  <a:pt x="347684" y="-4790"/>
+                  <a:pt x="461292" y="0"/>
+                </a:cubicBezTo>
+                <a:cubicBezTo>
+                  <a:pt x="574900" y="4790"/>
+                  <a:pt x="808367" y="19821"/>
+                  <a:pt x="1139662" y="0"/>
+                </a:cubicBezTo>
+                <a:cubicBezTo>
+                  <a:pt x="1470957" y="-19821"/>
+                  <a:pt x="1627405" y="5721"/>
+                  <a:pt x="1926572" y="0"/>
+                </a:cubicBezTo>
+                <a:cubicBezTo>
+                  <a:pt x="2225739" y="-5721"/>
+                  <a:pt x="2137730" y="-3235"/>
+                  <a:pt x="2279325" y="0"/>
+                </a:cubicBezTo>
+                <a:cubicBezTo>
+                  <a:pt x="2420920" y="3235"/>
+                  <a:pt x="2456518" y="9685"/>
+                  <a:pt x="2632078" y="0"/>
+                </a:cubicBezTo>
+                <a:cubicBezTo>
+                  <a:pt x="2807638" y="-9685"/>
+                  <a:pt x="3211516" y="-43007"/>
+                  <a:pt x="3527527" y="0"/>
+                </a:cubicBezTo>
+                <a:cubicBezTo>
+                  <a:pt x="3843538" y="43007"/>
+                  <a:pt x="4058833" y="22042"/>
+                  <a:pt x="4205897" y="0"/>
+                </a:cubicBezTo>
+                <a:cubicBezTo>
+                  <a:pt x="4352961" y="-22042"/>
+                  <a:pt x="4474805" y="-11846"/>
+                  <a:pt x="4558650" y="0"/>
+                </a:cubicBezTo>
+                <a:cubicBezTo>
+                  <a:pt x="4642495" y="11846"/>
+                  <a:pt x="5041928" y="-6069"/>
+                  <a:pt x="5237020" y="0"/>
+                </a:cubicBezTo>
+                <a:cubicBezTo>
+                  <a:pt x="5432112" y="6069"/>
+                  <a:pt x="5943266" y="-17479"/>
+                  <a:pt x="6132469" y="0"/>
+                </a:cubicBezTo>
+                <a:cubicBezTo>
+                  <a:pt x="6321672" y="17479"/>
+                  <a:pt x="6483872" y="26234"/>
+                  <a:pt x="6702301" y="0"/>
+                </a:cubicBezTo>
+                <a:cubicBezTo>
+                  <a:pt x="6920730" y="-26234"/>
+                  <a:pt x="6991194" y="-15156"/>
+                  <a:pt x="7272132" y="0"/>
+                </a:cubicBezTo>
+                <a:cubicBezTo>
+                  <a:pt x="7553070" y="15156"/>
+                  <a:pt x="7684444" y="-32961"/>
+                  <a:pt x="7950502" y="0"/>
+                </a:cubicBezTo>
+                <a:cubicBezTo>
+                  <a:pt x="8216560" y="32961"/>
+                  <a:pt x="8493290" y="-10491"/>
+                  <a:pt x="8737412" y="0"/>
+                </a:cubicBezTo>
+                <a:cubicBezTo>
+                  <a:pt x="8981534" y="10491"/>
+                  <a:pt x="9191586" y="-13899"/>
+                  <a:pt x="9524322" y="0"/>
+                </a:cubicBezTo>
+                <a:cubicBezTo>
+                  <a:pt x="9857058" y="13899"/>
+                  <a:pt x="10297509" y="7485"/>
+                  <a:pt x="10853928" y="0"/>
+                </a:cubicBezTo>
+                <a:cubicBezTo>
+                  <a:pt x="10854574" y="4451"/>
+                  <a:pt x="10854418" y="9226"/>
+                  <a:pt x="10853928" y="18288"/>
+                </a:cubicBezTo>
+                <a:cubicBezTo>
+                  <a:pt x="10691638" y="28522"/>
+                  <a:pt x="10574319" y="29578"/>
+                  <a:pt x="10392636" y="18288"/>
+                </a:cubicBezTo>
+                <a:cubicBezTo>
+                  <a:pt x="10210953" y="6998"/>
+                  <a:pt x="9836277" y="-16742"/>
+                  <a:pt x="9497187" y="18288"/>
+                </a:cubicBezTo>
+                <a:cubicBezTo>
+                  <a:pt x="9158097" y="53318"/>
+                  <a:pt x="9119479" y="30714"/>
+                  <a:pt x="8818817" y="18288"/>
+                </a:cubicBezTo>
+                <a:cubicBezTo>
+                  <a:pt x="8518155" y="5863"/>
+                  <a:pt x="8640037" y="6483"/>
+                  <a:pt x="8466064" y="18288"/>
+                </a:cubicBezTo>
+                <a:cubicBezTo>
+                  <a:pt x="8292091" y="30093"/>
+                  <a:pt x="7997656" y="18914"/>
+                  <a:pt x="7787693" y="18288"/>
+                </a:cubicBezTo>
+                <a:cubicBezTo>
+                  <a:pt x="7577730" y="17662"/>
+                  <a:pt x="7412468" y="21416"/>
+                  <a:pt x="7217862" y="18288"/>
+                </a:cubicBezTo>
+                <a:cubicBezTo>
+                  <a:pt x="7023256" y="15160"/>
+                  <a:pt x="6898018" y="14824"/>
+                  <a:pt x="6648031" y="18288"/>
+                </a:cubicBezTo>
+                <a:cubicBezTo>
+                  <a:pt x="6398044" y="21752"/>
+                  <a:pt x="6254402" y="38625"/>
+                  <a:pt x="6078200" y="18288"/>
+                </a:cubicBezTo>
+                <a:cubicBezTo>
+                  <a:pt x="5901998" y="-2049"/>
+                  <a:pt x="5622886" y="3213"/>
+                  <a:pt x="5508368" y="18288"/>
+                </a:cubicBezTo>
+                <a:cubicBezTo>
+                  <a:pt x="5393850" y="33363"/>
+                  <a:pt x="5036260" y="26830"/>
+                  <a:pt x="4721459" y="18288"/>
+                </a:cubicBezTo>
+                <a:cubicBezTo>
+                  <a:pt x="4406658" y="9746"/>
+                  <a:pt x="4239221" y="41551"/>
+                  <a:pt x="4043088" y="18288"/>
+                </a:cubicBezTo>
+                <a:cubicBezTo>
+                  <a:pt x="3846955" y="-4975"/>
+                  <a:pt x="3818802" y="34658"/>
+                  <a:pt x="3690336" y="18288"/>
+                </a:cubicBezTo>
+                <a:cubicBezTo>
+                  <a:pt x="3561870" y="1918"/>
+                  <a:pt x="3265491" y="42194"/>
+                  <a:pt x="3120504" y="18288"/>
+                </a:cubicBezTo>
+                <a:cubicBezTo>
+                  <a:pt x="2975517" y="-5618"/>
+                  <a:pt x="2720254" y="36673"/>
+                  <a:pt x="2333595" y="18288"/>
+                </a:cubicBezTo>
+                <a:cubicBezTo>
+                  <a:pt x="1946936" y="-97"/>
+                  <a:pt x="2097241" y="5776"/>
+                  <a:pt x="1872303" y="18288"/>
+                </a:cubicBezTo>
+                <a:cubicBezTo>
+                  <a:pt x="1647365" y="30800"/>
+                  <a:pt x="1282708" y="45380"/>
+                  <a:pt x="976854" y="18288"/>
+                </a:cubicBezTo>
+                <a:cubicBezTo>
+                  <a:pt x="671000" y="-8804"/>
+                  <a:pt x="408401" y="-12775"/>
+                  <a:pt x="0" y="18288"/>
+                </a:cubicBezTo>
+                <a:cubicBezTo>
+                  <a:pt x="-213" y="9468"/>
+                  <a:pt x="187" y="4459"/>
+                  <a:pt x="0" y="0"/>
+                </a:cubicBezTo>
+                <a:close/>
+              </a:path>
+              <a:path w="10853928" h="18288" stroke="0" extrusionOk="0">
+                <a:moveTo>
+                  <a:pt x="0" y="0"/>
+                </a:moveTo>
+                <a:cubicBezTo>
+                  <a:pt x="267322" y="15284"/>
+                  <a:pt x="415388" y="-21048"/>
+                  <a:pt x="569831" y="0"/>
+                </a:cubicBezTo>
+                <a:cubicBezTo>
+                  <a:pt x="724274" y="21048"/>
+                  <a:pt x="769333" y="-2353"/>
+                  <a:pt x="922584" y="0"/>
+                </a:cubicBezTo>
+                <a:cubicBezTo>
+                  <a:pt x="1075835" y="2353"/>
+                  <a:pt x="1399490" y="-145"/>
+                  <a:pt x="1818033" y="0"/>
+                </a:cubicBezTo>
+                <a:cubicBezTo>
+                  <a:pt x="2236576" y="145"/>
+                  <a:pt x="2145330" y="5482"/>
+                  <a:pt x="2387864" y="0"/>
+                </a:cubicBezTo>
+                <a:cubicBezTo>
+                  <a:pt x="2630398" y="-5482"/>
+                  <a:pt x="2793207" y="18487"/>
+                  <a:pt x="2957695" y="0"/>
+                </a:cubicBezTo>
+                <a:cubicBezTo>
+                  <a:pt x="3122183" y="-18487"/>
+                  <a:pt x="3579141" y="19003"/>
+                  <a:pt x="3853144" y="0"/>
+                </a:cubicBezTo>
+                <a:cubicBezTo>
+                  <a:pt x="4127147" y="-19003"/>
+                  <a:pt x="4209857" y="12211"/>
+                  <a:pt x="4314436" y="0"/>
+                </a:cubicBezTo>
+                <a:cubicBezTo>
+                  <a:pt x="4419015" y="-12211"/>
+                  <a:pt x="4762459" y="-17220"/>
+                  <a:pt x="5209885" y="0"/>
+                </a:cubicBezTo>
+                <a:cubicBezTo>
+                  <a:pt x="5657311" y="17220"/>
+                  <a:pt x="5692663" y="-3290"/>
+                  <a:pt x="6105335" y="0"/>
+                </a:cubicBezTo>
+                <a:cubicBezTo>
+                  <a:pt x="6518007" y="3290"/>
+                  <a:pt x="6455516" y="-5124"/>
+                  <a:pt x="6783705" y="0"/>
+                </a:cubicBezTo>
+                <a:cubicBezTo>
+                  <a:pt x="7111894" y="5124"/>
+                  <a:pt x="7441941" y="-17829"/>
+                  <a:pt x="7679154" y="0"/>
+                </a:cubicBezTo>
+                <a:cubicBezTo>
+                  <a:pt x="7916367" y="17829"/>
+                  <a:pt x="8102967" y="-24363"/>
+                  <a:pt x="8248985" y="0"/>
+                </a:cubicBezTo>
+                <a:cubicBezTo>
+                  <a:pt x="8395003" y="24363"/>
+                  <a:pt x="8552393" y="25505"/>
+                  <a:pt x="8818817" y="0"/>
+                </a:cubicBezTo>
+                <a:cubicBezTo>
+                  <a:pt x="9085241" y="-25505"/>
+                  <a:pt x="9411308" y="38000"/>
+                  <a:pt x="9605726" y="0"/>
+                </a:cubicBezTo>
+                <a:cubicBezTo>
+                  <a:pt x="9800144" y="-38000"/>
+                  <a:pt x="10006468" y="-25741"/>
+                  <a:pt x="10175558" y="0"/>
+                </a:cubicBezTo>
+                <a:cubicBezTo>
+                  <a:pt x="10344648" y="25741"/>
+                  <a:pt x="10696282" y="695"/>
+                  <a:pt x="10853928" y="0"/>
+                </a:cubicBezTo>
+                <a:cubicBezTo>
+                  <a:pt x="10853521" y="8690"/>
+                  <a:pt x="10853774" y="14141"/>
+                  <a:pt x="10853928" y="18288"/>
+                </a:cubicBezTo>
+                <a:cubicBezTo>
+                  <a:pt x="10608124" y="24255"/>
+                  <a:pt x="10343415" y="22307"/>
+                  <a:pt x="10067018" y="18288"/>
+                </a:cubicBezTo>
+                <a:cubicBezTo>
+                  <a:pt x="9790621" y="14270"/>
+                  <a:pt x="9843266" y="3564"/>
+                  <a:pt x="9714266" y="18288"/>
+                </a:cubicBezTo>
+                <a:cubicBezTo>
+                  <a:pt x="9585266" y="33012"/>
+                  <a:pt x="9379484" y="1875"/>
+                  <a:pt x="9252974" y="18288"/>
+                </a:cubicBezTo>
+                <a:cubicBezTo>
+                  <a:pt x="9126464" y="34701"/>
+                  <a:pt x="8580678" y="-4904"/>
+                  <a:pt x="8357525" y="18288"/>
+                </a:cubicBezTo>
+                <a:cubicBezTo>
+                  <a:pt x="8134372" y="41480"/>
+                  <a:pt x="7903199" y="26458"/>
+                  <a:pt x="7679154" y="18288"/>
+                </a:cubicBezTo>
+                <a:cubicBezTo>
+                  <a:pt x="7455109" y="10118"/>
+                  <a:pt x="7435944" y="27109"/>
+                  <a:pt x="7217862" y="18288"/>
+                </a:cubicBezTo>
+                <a:cubicBezTo>
+                  <a:pt x="6999780" y="9467"/>
+                  <a:pt x="6680409" y="18985"/>
+                  <a:pt x="6539492" y="18288"/>
+                </a:cubicBezTo>
+                <a:cubicBezTo>
+                  <a:pt x="6398575" y="17592"/>
+                  <a:pt x="6312077" y="33018"/>
+                  <a:pt x="6186739" y="18288"/>
+                </a:cubicBezTo>
+                <a:cubicBezTo>
+                  <a:pt x="6061401" y="3558"/>
+                  <a:pt x="5947033" y="12075"/>
+                  <a:pt x="5833986" y="18288"/>
+                </a:cubicBezTo>
+                <a:cubicBezTo>
+                  <a:pt x="5720939" y="24501"/>
+                  <a:pt x="5482226" y="8586"/>
+                  <a:pt x="5155616" y="18288"/>
+                </a:cubicBezTo>
+                <a:cubicBezTo>
+                  <a:pt x="4829006" y="27991"/>
+                  <a:pt x="4841274" y="29316"/>
+                  <a:pt x="4694324" y="18288"/>
+                </a:cubicBezTo>
+                <a:cubicBezTo>
+                  <a:pt x="4547374" y="7260"/>
+                  <a:pt x="4077675" y="7013"/>
+                  <a:pt x="3907414" y="18288"/>
+                </a:cubicBezTo>
+                <a:cubicBezTo>
+                  <a:pt x="3737153" y="29564"/>
+                  <a:pt x="3538393" y="21630"/>
+                  <a:pt x="3446122" y="18288"/>
+                </a:cubicBezTo>
+                <a:cubicBezTo>
+                  <a:pt x="3353851" y="14946"/>
+                  <a:pt x="2990320" y="-8091"/>
+                  <a:pt x="2659212" y="18288"/>
+                </a:cubicBezTo>
+                <a:cubicBezTo>
+                  <a:pt x="2328104" y="44667"/>
+                  <a:pt x="2427653" y="9607"/>
+                  <a:pt x="2306460" y="18288"/>
+                </a:cubicBezTo>
+                <a:cubicBezTo>
+                  <a:pt x="2185267" y="26969"/>
+                  <a:pt x="1719763" y="3717"/>
+                  <a:pt x="1519550" y="18288"/>
+                </a:cubicBezTo>
+                <a:cubicBezTo>
+                  <a:pt x="1319337" y="32860"/>
+                  <a:pt x="1167371" y="17040"/>
+                  <a:pt x="1058258" y="18288"/>
+                </a:cubicBezTo>
+                <a:cubicBezTo>
+                  <a:pt x="949145" y="19536"/>
+                  <a:pt x="780234" y="31447"/>
+                  <a:pt x="705505" y="18288"/>
+                </a:cubicBezTo>
+                <a:cubicBezTo>
+                  <a:pt x="630776" y="5129"/>
+                  <a:pt x="215796" y="30056"/>
+                  <a:pt x="0" y="18288"/>
+                </a:cubicBezTo>
+                <a:cubicBezTo>
+                  <a:pt x="-53" y="11301"/>
+                  <a:pt x="-649" y="7756"/>
+                  <a:pt x="0" y="0"/>
+                </a:cubicBezTo>
+                <a:close/>
+              </a:path>
+            </a:pathLst>
+          </a:custGeom>
+          <a:solidFill>
+            <a:schemeClr val="accent2"/>
+          </a:solidFill>
+          <a:ln w="41275" cap="rnd">
+            <a:solidFill>
+              <a:schemeClr val="accent2"/>
+            </a:solidFill>
+            <a:round/>
+            <a:extLst>
+              <a:ext uri="{C807C97D-BFC1-408E-A445-0C87EB9F89A2}">
+                <ask:lineSketchStyleProps xmlns:ask="http://schemas.microsoft.com/office/drawing/2018/sketchyshapes" sd="1219033472">
+                  <a:prstGeom prst="rect">
+                    <a:avLst/>
+                  </a:prstGeom>
+                  <ask:type>
+                    <ask:lineSketchFreehand/>
+                  </ask:type>
+                </ask:lineSketchStyleProps>
+              </a:ext>
+            </a:extLst>
+          </a:ln>
+        </p:spPr>
+        <p:style>
+          <a:lnRef idx="2">
+            <a:schemeClr val="accent1">
+              <a:shade val="50000"/>
+            </a:schemeClr>
+          </a:lnRef>
+          <a:fillRef idx="1">
+            <a:schemeClr val="accent1"/>
+          </a:fillRef>
+          <a:effectRef idx="0">
+            <a:schemeClr val="accent1"/>
+          </a:effectRef>
+          <a:fontRef idx="minor">
+            <a:schemeClr val="lt1"/>
+          </a:fontRef>
+        </p:style>
+        <p:txBody>
+          <a:bodyPr rtlCol="0" anchor="ctr"/>
+          <a:lstStyle/>
+          <a:p>
+            <a:pPr algn="ctr"/>
+            <a:endParaRPr lang="en-US"/>
+          </a:p>
+        </p:txBody>
+      </p:sp>
+      <p:sp>
+        <p:nvSpPr>
           <p:cNvPr id="3" name="Espace réservé du contenu 2">
             <a:extLst>
               <a:ext uri="{FF2B5EF4-FFF2-40B4-BE49-F238E27FC236}">
@@ -7997,12 +9586,28 @@
             <p:ph idx="1"/>
           </p:nvPr>
         </p:nvSpPr>
-        <p:spPr/>
-        <p:txBody>
-          <a:bodyPr/>
+        <p:spPr>
+          <a:xfrm>
+            <a:off x="838200" y="1929384"/>
+            <a:ext cx="10515600" cy="4251960"/>
+          </a:xfrm>
+        </p:spPr>
+        <p:txBody>
+          <a:bodyPr>
+            <a:normAutofit/>
+          </a:bodyPr>
           <a:lstStyle/>
           <a:p>
-            <a:endParaRPr lang="en-CH"/>
+            <a:r>
+              <a:rPr lang="it-IT" sz="2200"/>
+              <a:t>Copia completa</a:t>
+            </a:r>
+          </a:p>
+          <a:p>
+            <a:r>
+              <a:rPr lang="it-IT" sz="2200"/>
+              <a:t>Forza principale</a:t>
+            </a:r>
           </a:p>
         </p:txBody>
       </p:sp>
@@ -8016,6 +9621,1078 @@
   <p:clrMapOvr>
     <a:masterClrMapping/>
   </p:clrMapOvr>
+  <p:extLst>
+    <p:ext uri="{6950BFC3-D8DA-4A85-94F7-54DA5524770B}">
+      <p188:commentRel xmlns:p188="http://schemas.microsoft.com/office/powerpoint/2018/8/main" r:id="rId3"/>
+    </p:ext>
+  </p:extLst>
+</p:sld>
+</file>
+
+<file path=ppt/slides/slide8.xml><?xml version="1.0" encoding="utf-8"?>
+<p:sld xmlns:a="http://schemas.openxmlformats.org/drawingml/2006/main" xmlns:r="http://schemas.openxmlformats.org/officeDocument/2006/relationships" xmlns:p="http://schemas.openxmlformats.org/presentationml/2006/main">
+  <p:cSld>
+    <p:bg>
+      <p:bgPr>
+        <a:solidFill>
+          <a:schemeClr val="bg1"/>
+        </a:solidFill>
+        <a:effectLst/>
+      </p:bgPr>
+    </p:bg>
+    <p:spTree>
+      <p:nvGrpSpPr>
+        <p:cNvPr id="1" name=""/>
+        <p:cNvGrpSpPr/>
+        <p:nvPr/>
+      </p:nvGrpSpPr>
+      <p:grpSpPr>
+        <a:xfrm>
+          <a:off x="0" y="0"/>
+          <a:ext cx="0" cy="0"/>
+          <a:chOff x="0" y="0"/>
+          <a:chExt cx="0" cy="0"/>
+        </a:xfrm>
+      </p:grpSpPr>
+      <p:sp useBgFill="1">
+        <p:nvSpPr>
+          <p:cNvPr id="1031" name="Rectangle 1030">
+            <a:extLst>
+              <a:ext uri="{FF2B5EF4-FFF2-40B4-BE49-F238E27FC236}">
+                <a16:creationId xmlns:a16="http://schemas.microsoft.com/office/drawing/2014/main" id="{2B97F24A-32CE-4C1C-A50D-3016B394DCFB}"/>
+              </a:ext>
+              <a:ext uri="{C183D7F6-B498-43B3-948B-1728B52AA6E4}">
+                <adec:decorative xmlns:adec="http://schemas.microsoft.com/office/drawing/2017/decorative" val="1"/>
+              </a:ext>
+            </a:extLst>
+          </p:cNvPr>
+          <p:cNvSpPr>
+            <a:spLocks noGrp="1" noRot="1" noChangeAspect="1" noMove="1" noResize="1" noEditPoints="1" noAdjustHandles="1" noChangeArrowheads="1" noChangeShapeType="1" noTextEdit="1"/>
+          </p:cNvSpPr>
+          <p:nvPr>
+            <p:extLst>
+              <p:ext uri="{386F3935-93C4-4BCD-93E2-E3B085C9AB24}">
+                <p16:designElem xmlns:p16="http://schemas.microsoft.com/office/powerpoint/2015/main" val="1"/>
+              </p:ext>
+            </p:extLst>
+          </p:nvPr>
+        </p:nvSpPr>
+        <p:spPr>
+          <a:xfrm>
+            <a:off x="0" y="0"/>
+            <a:ext cx="12192000" cy="6858000"/>
+          </a:xfrm>
+          <a:prstGeom prst="rect">
+            <a:avLst/>
+          </a:prstGeom>
+          <a:ln>
+            <a:noFill/>
+          </a:ln>
+        </p:spPr>
+        <p:style>
+          <a:lnRef idx="2">
+            <a:schemeClr val="accent1">
+              <a:shade val="50000"/>
+            </a:schemeClr>
+          </a:lnRef>
+          <a:fillRef idx="1">
+            <a:schemeClr val="accent1"/>
+          </a:fillRef>
+          <a:effectRef idx="0">
+            <a:schemeClr val="accent1"/>
+          </a:effectRef>
+          <a:fontRef idx="minor">
+            <a:schemeClr val="lt1"/>
+          </a:fontRef>
+        </p:style>
+        <p:txBody>
+          <a:bodyPr rtlCol="0" anchor="ctr"/>
+          <a:lstStyle/>
+          <a:p>
+            <a:pPr algn="ctr"/>
+            <a:endParaRPr lang="en-US"/>
+          </a:p>
+        </p:txBody>
+      </p:sp>
+      <p:sp>
+        <p:nvSpPr>
+          <p:cNvPr id="2" name="Titre 1">
+            <a:extLst>
+              <a:ext uri="{FF2B5EF4-FFF2-40B4-BE49-F238E27FC236}">
+                <a16:creationId xmlns:a16="http://schemas.microsoft.com/office/drawing/2014/main" id="{DAAE1537-8F33-6746-1C1A-F1A27A192551}"/>
+              </a:ext>
+            </a:extLst>
+          </p:cNvPr>
+          <p:cNvSpPr>
+            <a:spLocks noGrp="1"/>
+          </p:cNvSpPr>
+          <p:nvPr>
+            <p:ph type="title"/>
+          </p:nvPr>
+        </p:nvSpPr>
+        <p:spPr>
+          <a:xfrm>
+            <a:off x="630936" y="639520"/>
+            <a:ext cx="3429000" cy="1719072"/>
+          </a:xfrm>
+        </p:spPr>
+        <p:txBody>
+          <a:bodyPr anchor="b">
+            <a:normAutofit/>
+          </a:bodyPr>
+          <a:lstStyle/>
+          <a:p>
+            <a:r>
+              <a:rPr lang="fr-FR" sz="5400"/>
+              <a:t>Alternative-</a:t>
+            </a:r>
+            <a:r>
+              <a:rPr lang="it-IT" sz="5400"/>
+              <a:t> GitLab</a:t>
+            </a:r>
+            <a:endParaRPr lang="en-CH" sz="5400"/>
+          </a:p>
+        </p:txBody>
+      </p:sp>
+      <p:sp>
+        <p:nvSpPr>
+          <p:cNvPr id="1033" name="sketch line">
+            <a:extLst>
+              <a:ext uri="{FF2B5EF4-FFF2-40B4-BE49-F238E27FC236}">
+                <a16:creationId xmlns:a16="http://schemas.microsoft.com/office/drawing/2014/main" id="{6357EC4F-235E-4222-A36F-C7878ACE37F2}"/>
+              </a:ext>
+              <a:ext uri="{C183D7F6-B498-43B3-948B-1728B52AA6E4}">
+                <adec:decorative xmlns:adec="http://schemas.microsoft.com/office/drawing/2017/decorative" val="1"/>
+              </a:ext>
+            </a:extLst>
+          </p:cNvPr>
+          <p:cNvSpPr>
+            <a:spLocks noGrp="1" noRot="1" noChangeAspect="1" noMove="1" noResize="1" noEditPoints="1" noAdjustHandles="1" noChangeArrowheads="1" noChangeShapeType="1" noTextEdit="1"/>
+          </p:cNvSpPr>
+          <p:nvPr>
+            <p:extLst>
+              <p:ext uri="{386F3935-93C4-4BCD-93E2-E3B085C9AB24}">
+                <p16:designElem xmlns:p16="http://schemas.microsoft.com/office/powerpoint/2015/main" val="1"/>
+              </p:ext>
+            </p:extLst>
+          </p:nvPr>
+        </p:nvSpPr>
+        <p:spPr>
+          <a:xfrm>
+            <a:off x="643278" y="2573756"/>
+            <a:ext cx="3255095" cy="18288"/>
+          </a:xfrm>
+          <a:custGeom>
+            <a:avLst/>
+            <a:gdLst>
+              <a:gd name="connsiteX0" fmla="*/ 0 w 3255095"/>
+              <a:gd name="connsiteY0" fmla="*/ 0 h 18288"/>
+              <a:gd name="connsiteX1" fmla="*/ 618468 w 3255095"/>
+              <a:gd name="connsiteY1" fmla="*/ 0 h 18288"/>
+              <a:gd name="connsiteX2" fmla="*/ 1269487 w 3255095"/>
+              <a:gd name="connsiteY2" fmla="*/ 0 h 18288"/>
+              <a:gd name="connsiteX3" fmla="*/ 1953057 w 3255095"/>
+              <a:gd name="connsiteY3" fmla="*/ 0 h 18288"/>
+              <a:gd name="connsiteX4" fmla="*/ 2636627 w 3255095"/>
+              <a:gd name="connsiteY4" fmla="*/ 0 h 18288"/>
+              <a:gd name="connsiteX5" fmla="*/ 3255095 w 3255095"/>
+              <a:gd name="connsiteY5" fmla="*/ 0 h 18288"/>
+              <a:gd name="connsiteX6" fmla="*/ 3255095 w 3255095"/>
+              <a:gd name="connsiteY6" fmla="*/ 18288 h 18288"/>
+              <a:gd name="connsiteX7" fmla="*/ 2538974 w 3255095"/>
+              <a:gd name="connsiteY7" fmla="*/ 18288 h 18288"/>
+              <a:gd name="connsiteX8" fmla="*/ 1822853 w 3255095"/>
+              <a:gd name="connsiteY8" fmla="*/ 18288 h 18288"/>
+              <a:gd name="connsiteX9" fmla="*/ 1171834 w 3255095"/>
+              <a:gd name="connsiteY9" fmla="*/ 18288 h 18288"/>
+              <a:gd name="connsiteX10" fmla="*/ 0 w 3255095"/>
+              <a:gd name="connsiteY10" fmla="*/ 18288 h 18288"/>
+              <a:gd name="connsiteX11" fmla="*/ 0 w 3255095"/>
+              <a:gd name="connsiteY11" fmla="*/ 0 h 18288"/>
+            </a:gdLst>
+            <a:ahLst/>
+            <a:cxnLst>
+              <a:cxn ang="0">
+                <a:pos x="connsiteX0" y="connsiteY0"/>
+              </a:cxn>
+              <a:cxn ang="0">
+                <a:pos x="connsiteX1" y="connsiteY1"/>
+              </a:cxn>
+              <a:cxn ang="0">
+                <a:pos x="connsiteX2" y="connsiteY2"/>
+              </a:cxn>
+              <a:cxn ang="0">
+                <a:pos x="connsiteX3" y="connsiteY3"/>
+              </a:cxn>
+              <a:cxn ang="0">
+                <a:pos x="connsiteX4" y="connsiteY4"/>
+              </a:cxn>
+              <a:cxn ang="0">
+                <a:pos x="connsiteX5" y="connsiteY5"/>
+              </a:cxn>
+              <a:cxn ang="0">
+                <a:pos x="connsiteX6" y="connsiteY6"/>
+              </a:cxn>
+              <a:cxn ang="0">
+                <a:pos x="connsiteX7" y="connsiteY7"/>
+              </a:cxn>
+              <a:cxn ang="0">
+                <a:pos x="connsiteX8" y="connsiteY8"/>
+              </a:cxn>
+              <a:cxn ang="0">
+                <a:pos x="connsiteX9" y="connsiteY9"/>
+              </a:cxn>
+              <a:cxn ang="0">
+                <a:pos x="connsiteX10" y="connsiteY10"/>
+              </a:cxn>
+              <a:cxn ang="0">
+                <a:pos x="connsiteX11" y="connsiteY11"/>
+              </a:cxn>
+            </a:cxnLst>
+            <a:rect l="l" t="t" r="r" b="b"/>
+            <a:pathLst>
+              <a:path w="3255095" h="18288" fill="none" extrusionOk="0">
+                <a:moveTo>
+                  <a:pt x="0" y="0"/>
+                </a:moveTo>
+                <a:cubicBezTo>
+                  <a:pt x="240201" y="-22123"/>
+                  <a:pt x="462021" y="-19623"/>
+                  <a:pt x="618468" y="0"/>
+                </a:cubicBezTo>
+                <a:cubicBezTo>
+                  <a:pt x="774915" y="19623"/>
+                  <a:pt x="974734" y="2035"/>
+                  <a:pt x="1269487" y="0"/>
+                </a:cubicBezTo>
+                <a:cubicBezTo>
+                  <a:pt x="1564240" y="-2035"/>
+                  <a:pt x="1733579" y="10639"/>
+                  <a:pt x="1953057" y="0"/>
+                </a:cubicBezTo>
+                <a:cubicBezTo>
+                  <a:pt x="2172535" y="-10639"/>
+                  <a:pt x="2453962" y="14018"/>
+                  <a:pt x="2636627" y="0"/>
+                </a:cubicBezTo>
+                <a:cubicBezTo>
+                  <a:pt x="2819292" y="-14018"/>
+                  <a:pt x="3121375" y="5399"/>
+                  <a:pt x="3255095" y="0"/>
+                </a:cubicBezTo>
+                <a:cubicBezTo>
+                  <a:pt x="3254386" y="8157"/>
+                  <a:pt x="3254682" y="12125"/>
+                  <a:pt x="3255095" y="18288"/>
+                </a:cubicBezTo>
+                <a:cubicBezTo>
+                  <a:pt x="3088545" y="23203"/>
+                  <a:pt x="2687475" y="7419"/>
+                  <a:pt x="2538974" y="18288"/>
+                </a:cubicBezTo>
+                <a:cubicBezTo>
+                  <a:pt x="2390473" y="29157"/>
+                  <a:pt x="2137381" y="-8959"/>
+                  <a:pt x="1822853" y="18288"/>
+                </a:cubicBezTo>
+                <a:cubicBezTo>
+                  <a:pt x="1508325" y="45535"/>
+                  <a:pt x="1466437" y="20385"/>
+                  <a:pt x="1171834" y="18288"/>
+                </a:cubicBezTo>
+                <a:cubicBezTo>
+                  <a:pt x="877231" y="16191"/>
+                  <a:pt x="561097" y="37643"/>
+                  <a:pt x="0" y="18288"/>
+                </a:cubicBezTo>
+                <a:cubicBezTo>
+                  <a:pt x="-46" y="12483"/>
+                  <a:pt x="-203" y="6491"/>
+                  <a:pt x="0" y="0"/>
+                </a:cubicBezTo>
+                <a:close/>
+              </a:path>
+              <a:path w="3255095" h="18288" stroke="0" extrusionOk="0">
+                <a:moveTo>
+                  <a:pt x="0" y="0"/>
+                </a:moveTo>
+                <a:cubicBezTo>
+                  <a:pt x="291965" y="19429"/>
+                  <a:pt x="363155" y="8568"/>
+                  <a:pt x="618468" y="0"/>
+                </a:cubicBezTo>
+                <a:cubicBezTo>
+                  <a:pt x="873781" y="-8568"/>
+                  <a:pt x="904459" y="-19505"/>
+                  <a:pt x="1171834" y="0"/>
+                </a:cubicBezTo>
+                <a:cubicBezTo>
+                  <a:pt x="1439209" y="19505"/>
+                  <a:pt x="1744369" y="9790"/>
+                  <a:pt x="1887955" y="0"/>
+                </a:cubicBezTo>
+                <a:cubicBezTo>
+                  <a:pt x="2031541" y="-9790"/>
+                  <a:pt x="2346378" y="21240"/>
+                  <a:pt x="2506423" y="0"/>
+                </a:cubicBezTo>
+                <a:cubicBezTo>
+                  <a:pt x="2666468" y="-21240"/>
+                  <a:pt x="2990257" y="30414"/>
+                  <a:pt x="3255095" y="0"/>
+                </a:cubicBezTo>
+                <a:cubicBezTo>
+                  <a:pt x="3254831" y="4493"/>
+                  <a:pt x="3255479" y="9472"/>
+                  <a:pt x="3255095" y="18288"/>
+                </a:cubicBezTo>
+                <a:cubicBezTo>
+                  <a:pt x="3120743" y="16690"/>
+                  <a:pt x="2759628" y="42462"/>
+                  <a:pt x="2604076" y="18288"/>
+                </a:cubicBezTo>
+                <a:cubicBezTo>
+                  <a:pt x="2448524" y="-5886"/>
+                  <a:pt x="2184336" y="19599"/>
+                  <a:pt x="1887955" y="18288"/>
+                </a:cubicBezTo>
+                <a:cubicBezTo>
+                  <a:pt x="1591574" y="16977"/>
+                  <a:pt x="1548845" y="6870"/>
+                  <a:pt x="1334589" y="18288"/>
+                </a:cubicBezTo>
+                <a:cubicBezTo>
+                  <a:pt x="1120333" y="29706"/>
+                  <a:pt x="996014" y="9662"/>
+                  <a:pt x="683570" y="18288"/>
+                </a:cubicBezTo>
+                <a:cubicBezTo>
+                  <a:pt x="371126" y="26914"/>
+                  <a:pt x="198687" y="16167"/>
+                  <a:pt x="0" y="18288"/>
+                </a:cubicBezTo>
+                <a:cubicBezTo>
+                  <a:pt x="843" y="9577"/>
+                  <a:pt x="371" y="6900"/>
+                  <a:pt x="0" y="0"/>
+                </a:cubicBezTo>
+                <a:close/>
+              </a:path>
+            </a:pathLst>
+          </a:custGeom>
+          <a:solidFill>
+            <a:schemeClr val="accent2"/>
+          </a:solidFill>
+          <a:ln w="38100" cap="rnd">
+            <a:solidFill>
+              <a:schemeClr val="accent2"/>
+            </a:solidFill>
+            <a:round/>
+            <a:extLst>
+              <a:ext uri="{C807C97D-BFC1-408E-A445-0C87EB9F89A2}">
+                <ask:lineSketchStyleProps xmlns:ask="http://schemas.microsoft.com/office/drawing/2018/sketchyshapes" sd="1219033472">
+                  <a:prstGeom prst="rect">
+                    <a:avLst/>
+                  </a:prstGeom>
+                  <ask:type>
+                    <ask:lineSketchFreehand/>
+                  </ask:type>
+                </ask:lineSketchStyleProps>
+              </a:ext>
+            </a:extLst>
+          </a:ln>
+        </p:spPr>
+        <p:style>
+          <a:lnRef idx="2">
+            <a:schemeClr val="accent1">
+              <a:shade val="50000"/>
+            </a:schemeClr>
+          </a:lnRef>
+          <a:fillRef idx="1">
+            <a:schemeClr val="accent1"/>
+          </a:fillRef>
+          <a:effectRef idx="0">
+            <a:schemeClr val="accent1"/>
+          </a:effectRef>
+          <a:fontRef idx="minor">
+            <a:schemeClr val="lt1"/>
+          </a:fontRef>
+        </p:style>
+        <p:txBody>
+          <a:bodyPr rtlCol="0" anchor="ctr"/>
+          <a:lstStyle/>
+          <a:p>
+            <a:pPr algn="ctr"/>
+            <a:endParaRPr lang="en-US"/>
+          </a:p>
+        </p:txBody>
+      </p:sp>
+      <p:sp>
+        <p:nvSpPr>
+          <p:cNvPr id="3" name="Espace réservé du contenu 2">
+            <a:extLst>
+              <a:ext uri="{FF2B5EF4-FFF2-40B4-BE49-F238E27FC236}">
+                <a16:creationId xmlns:a16="http://schemas.microsoft.com/office/drawing/2014/main" id="{D15F5099-84ED-F4EA-34FE-05057D0E36C5}"/>
+              </a:ext>
+            </a:extLst>
+          </p:cNvPr>
+          <p:cNvSpPr>
+            <a:spLocks noGrp="1"/>
+          </p:cNvSpPr>
+          <p:nvPr>
+            <p:ph idx="1"/>
+          </p:nvPr>
+        </p:nvSpPr>
+        <p:spPr>
+          <a:xfrm>
+            <a:off x="630936" y="2807208"/>
+            <a:ext cx="3429000" cy="3410712"/>
+          </a:xfrm>
+        </p:spPr>
+        <p:txBody>
+          <a:bodyPr anchor="t">
+            <a:normAutofit/>
+          </a:bodyPr>
+          <a:lstStyle/>
+          <a:p>
+            <a:pPr marL="0" indent="0">
+              <a:buNone/>
+            </a:pPr>
+            <a:r>
+              <a:rPr lang="it-IT" sz="2200"/>
+              <a:t>Disponibile in versione cloud o self-hosted</a:t>
+            </a:r>
+          </a:p>
+          <a:p>
+            <a:pPr marL="0" indent="0">
+              <a:buNone/>
+            </a:pPr>
+            <a:r>
+              <a:rPr lang="it-IT" sz="2200"/>
+              <a:t>Integrazione CI/CD nativa e molto potente.</a:t>
+            </a:r>
+          </a:p>
+          <a:p>
+            <a:pPr marL="0" indent="0">
+              <a:buNone/>
+            </a:pPr>
+            <a:r>
+              <a:rPr lang="it-IT" sz="2200"/>
+              <a:t>Strumenti avanzati</a:t>
+            </a:r>
+            <a:endParaRPr lang="en-CH" sz="2200"/>
+          </a:p>
+        </p:txBody>
+      </p:sp>
+      <p:pic>
+        <p:nvPicPr>
+          <p:cNvPr id="1026" name="Picture 2" descr="We Migrated From GitHub to GitLab | by Caio Andrade | The Startup | Medium">
+            <a:extLst>
+              <a:ext uri="{FF2B5EF4-FFF2-40B4-BE49-F238E27FC236}">
+                <a16:creationId xmlns:a16="http://schemas.microsoft.com/office/drawing/2014/main" id="{3F0ED959-083F-DC10-48E6-634D42D81A7E}"/>
+              </a:ext>
+            </a:extLst>
+          </p:cNvPr>
+          <p:cNvPicPr>
+            <a:picLocks noChangeAspect="1" noChangeArrowheads="1"/>
+          </p:cNvPicPr>
+          <p:nvPr/>
+        </p:nvPicPr>
+        <p:blipFill>
+          <a:blip r:embed="rId3">
+            <a:extLst>
+              <a:ext uri="{28A0092B-C50C-407E-A947-70E740481C1C}">
+                <a14:useLocalDpi xmlns:a14="http://schemas.microsoft.com/office/drawing/2010/main" val="0"/>
+              </a:ext>
+            </a:extLst>
+          </a:blip>
+          <a:stretch>
+            <a:fillRect/>
+          </a:stretch>
+        </p:blipFill>
+        <p:spPr bwMode="auto">
+          <a:xfrm>
+            <a:off x="4654296" y="1124883"/>
+            <a:ext cx="6903720" cy="4608233"/>
+          </a:xfrm>
+          <a:prstGeom prst="rect">
+            <a:avLst/>
+          </a:prstGeom>
+          <a:noFill/>
+          <a:extLst>
+            <a:ext uri="{909E8E84-426E-40DD-AFC4-6F175D3DCCD1}">
+              <a14:hiddenFill xmlns:a14="http://schemas.microsoft.com/office/drawing/2010/main">
+                <a:solidFill>
+                  <a:srgbClr val="FFFFFF"/>
+                </a:solidFill>
+              </a14:hiddenFill>
+            </a:ext>
+          </a:extLst>
+        </p:spPr>
+      </p:pic>
+    </p:spTree>
+    <p:extLst>
+      <p:ext uri="{BB962C8B-B14F-4D97-AF65-F5344CB8AC3E}">
+        <p14:creationId xmlns:p14="http://schemas.microsoft.com/office/powerpoint/2010/main" val="855517778"/>
+      </p:ext>
+    </p:extLst>
+  </p:cSld>
+  <p:clrMapOvr>
+    <a:masterClrMapping/>
+  </p:clrMapOvr>
+  <p:extLst>
+    <p:ext uri="{6950BFC3-D8DA-4A85-94F7-54DA5524770B}">
+      <p188:commentRel xmlns:p188="http://schemas.microsoft.com/office/powerpoint/2018/8/main" r:id="rId2"/>
+    </p:ext>
+  </p:extLst>
+</p:sld>
+</file>
+
+<file path=ppt/slides/slide9.xml><?xml version="1.0" encoding="utf-8"?>
+<p:sld xmlns:a="http://schemas.openxmlformats.org/drawingml/2006/main" xmlns:r="http://schemas.openxmlformats.org/officeDocument/2006/relationships" xmlns:p="http://schemas.openxmlformats.org/presentationml/2006/main">
+  <p:cSld>
+    <p:bg>
+      <p:bgPr>
+        <a:solidFill>
+          <a:schemeClr val="bg1"/>
+        </a:solidFill>
+        <a:effectLst/>
+      </p:bgPr>
+    </p:bg>
+    <p:spTree>
+      <p:nvGrpSpPr>
+        <p:cNvPr id="1" name=""/>
+        <p:cNvGrpSpPr/>
+        <p:nvPr/>
+      </p:nvGrpSpPr>
+      <p:grpSpPr>
+        <a:xfrm>
+          <a:off x="0" y="0"/>
+          <a:ext cx="0" cy="0"/>
+          <a:chOff x="0" y="0"/>
+          <a:chExt cx="0" cy="0"/>
+        </a:xfrm>
+      </p:grpSpPr>
+      <p:sp useBgFill="1">
+        <p:nvSpPr>
+          <p:cNvPr id="10" name="Rectangle 9">
+            <a:extLst>
+              <a:ext uri="{FF2B5EF4-FFF2-40B4-BE49-F238E27FC236}">
+                <a16:creationId xmlns:a16="http://schemas.microsoft.com/office/drawing/2014/main" id="{058A14AF-9FB5-4CC7-BA35-E8E85D3EDF0E}"/>
+              </a:ext>
+              <a:ext uri="{C183D7F6-B498-43B3-948B-1728B52AA6E4}">
+                <adec:decorative xmlns:adec="http://schemas.microsoft.com/office/drawing/2017/decorative" val="1"/>
+              </a:ext>
+            </a:extLst>
+          </p:cNvPr>
+          <p:cNvSpPr>
+            <a:spLocks noGrp="1" noRot="1" noChangeAspect="1" noMove="1" noResize="1" noEditPoints="1" noAdjustHandles="1" noChangeArrowheads="1" noChangeShapeType="1" noTextEdit="1"/>
+          </p:cNvSpPr>
+          <p:nvPr>
+            <p:extLst>
+              <p:ext uri="{386F3935-93C4-4BCD-93E2-E3B085C9AB24}">
+                <p16:designElem xmlns:p16="http://schemas.microsoft.com/office/powerpoint/2015/main" val="1"/>
+              </p:ext>
+            </p:extLst>
+          </p:nvPr>
+        </p:nvSpPr>
+        <p:spPr>
+          <a:xfrm>
+            <a:off x="0" y="0"/>
+            <a:ext cx="12191999" cy="6857365"/>
+          </a:xfrm>
+          <a:prstGeom prst="rect">
+            <a:avLst/>
+          </a:prstGeom>
+          <a:ln>
+            <a:noFill/>
+          </a:ln>
+        </p:spPr>
+        <p:style>
+          <a:lnRef idx="2">
+            <a:schemeClr val="accent1">
+              <a:shade val="50000"/>
+            </a:schemeClr>
+          </a:lnRef>
+          <a:fillRef idx="1">
+            <a:schemeClr val="accent1"/>
+          </a:fillRef>
+          <a:effectRef idx="0">
+            <a:schemeClr val="accent1"/>
+          </a:effectRef>
+          <a:fontRef idx="minor">
+            <a:schemeClr val="lt1"/>
+          </a:fontRef>
+        </p:style>
+        <p:txBody>
+          <a:bodyPr rtlCol="0" anchor="ctr"/>
+          <a:lstStyle/>
+          <a:p>
+            <a:pPr algn="ctr"/>
+            <a:endParaRPr lang="en-US"/>
+          </a:p>
+        </p:txBody>
+      </p:sp>
+      <p:sp>
+        <p:nvSpPr>
+          <p:cNvPr id="2" name="Titre 1">
+            <a:extLst>
+              <a:ext uri="{FF2B5EF4-FFF2-40B4-BE49-F238E27FC236}">
+                <a16:creationId xmlns:a16="http://schemas.microsoft.com/office/drawing/2014/main" id="{9BCC4BA9-1871-DE95-080F-329E3E09CBCE}"/>
+              </a:ext>
+            </a:extLst>
+          </p:cNvPr>
+          <p:cNvSpPr>
+            <a:spLocks noGrp="1"/>
+          </p:cNvSpPr>
+          <p:nvPr>
+            <p:ph type="title"/>
+          </p:nvPr>
+        </p:nvSpPr>
+        <p:spPr>
+          <a:xfrm>
+            <a:off x="793662" y="386930"/>
+            <a:ext cx="10066122" cy="1298448"/>
+          </a:xfrm>
+        </p:spPr>
+        <p:txBody>
+          <a:bodyPr anchor="b">
+            <a:normAutofit/>
+          </a:bodyPr>
+          <a:lstStyle/>
+          <a:p>
+            <a:r>
+              <a:rPr lang="fr-FR" sz="4800"/>
+              <a:t>Alternative- Bitbucket</a:t>
+            </a:r>
+            <a:endParaRPr lang="en-CH" sz="4800"/>
+          </a:p>
+        </p:txBody>
+      </p:sp>
+      <p:sp>
+        <p:nvSpPr>
+          <p:cNvPr id="12" name="Rectangle 11">
+            <a:extLst>
+              <a:ext uri="{FF2B5EF4-FFF2-40B4-BE49-F238E27FC236}">
+                <a16:creationId xmlns:a16="http://schemas.microsoft.com/office/drawing/2014/main" id="{3A9A4357-BD1D-4622-A4FE-766E6AB8DE84}"/>
+              </a:ext>
+              <a:ext uri="{C183D7F6-B498-43B3-948B-1728B52AA6E4}">
+                <adec:decorative xmlns:adec="http://schemas.microsoft.com/office/drawing/2017/decorative" val="1"/>
+              </a:ext>
+            </a:extLst>
+          </p:cNvPr>
+          <p:cNvSpPr>
+            <a:spLocks noGrp="1" noRot="1" noChangeAspect="1" noMove="1" noResize="1" noEditPoints="1" noAdjustHandles="1" noChangeArrowheads="1" noChangeShapeType="1" noTextEdit="1"/>
+          </p:cNvSpPr>
+          <p:nvPr>
+            <p:extLst>
+              <p:ext uri="{386F3935-93C4-4BCD-93E2-E3B085C9AB24}">
+                <p16:designElem xmlns:p16="http://schemas.microsoft.com/office/powerpoint/2015/main" val="1"/>
+              </p:ext>
+            </p:extLst>
+          </p:nvPr>
+        </p:nvSpPr>
+        <p:spPr>
+          <a:xfrm flipH="1" flipV="1">
+            <a:off x="-2" y="1998845"/>
+            <a:ext cx="11454595" cy="781699"/>
+          </a:xfrm>
+          <a:prstGeom prst="rect">
+            <a:avLst/>
+          </a:prstGeom>
+          <a:solidFill>
+            <a:schemeClr val="accent4"/>
+          </a:solidFill>
+          <a:ln>
+            <a:noFill/>
+          </a:ln>
+        </p:spPr>
+        <p:style>
+          <a:lnRef idx="2">
+            <a:schemeClr val="accent1">
+              <a:shade val="50000"/>
+            </a:schemeClr>
+          </a:lnRef>
+          <a:fillRef idx="1">
+            <a:schemeClr val="accent1"/>
+          </a:fillRef>
+          <a:effectRef idx="0">
+            <a:schemeClr val="accent1"/>
+          </a:effectRef>
+          <a:fontRef idx="minor">
+            <a:schemeClr val="lt1"/>
+          </a:fontRef>
+        </p:style>
+        <p:txBody>
+          <a:bodyPr rtlCol="0" anchor="ctr"/>
+          <a:lstStyle/>
+          <a:p>
+            <a:pPr algn="ctr"/>
+            <a:endParaRPr lang="en-US"/>
+          </a:p>
+        </p:txBody>
+      </p:sp>
+      <p:sp>
+        <p:nvSpPr>
+          <p:cNvPr id="14" name="Rectangle 13">
+            <a:extLst>
+              <a:ext uri="{FF2B5EF4-FFF2-40B4-BE49-F238E27FC236}">
+                <a16:creationId xmlns:a16="http://schemas.microsoft.com/office/drawing/2014/main" id="{E659831F-0D9A-4C63-9EBB-8435B85A440F}"/>
+              </a:ext>
+              <a:ext uri="{C183D7F6-B498-43B3-948B-1728B52AA6E4}">
+                <adec:decorative xmlns:adec="http://schemas.microsoft.com/office/drawing/2017/decorative" val="1"/>
+              </a:ext>
+            </a:extLst>
+          </p:cNvPr>
+          <p:cNvSpPr>
+            <a:spLocks noGrp="1" noRot="1" noChangeAspect="1" noMove="1" noResize="1" noEditPoints="1" noAdjustHandles="1" noChangeArrowheads="1" noChangeShapeType="1" noTextEdit="1"/>
+          </p:cNvSpPr>
+          <p:nvPr>
+            <p:extLst>
+              <p:ext uri="{386F3935-93C4-4BCD-93E2-E3B085C9AB24}">
+                <p16:designElem xmlns:p16="http://schemas.microsoft.com/office/powerpoint/2015/main" val="1"/>
+              </p:ext>
+            </p:extLst>
+          </p:nvPr>
+        </p:nvSpPr>
+        <p:spPr>
+          <a:xfrm>
+            <a:off x="0" y="2203079"/>
+            <a:ext cx="11383362" cy="4267991"/>
+          </a:xfrm>
+          <a:prstGeom prst="rect">
+            <a:avLst/>
+          </a:prstGeom>
+          <a:solidFill>
+            <a:schemeClr val="bg1"/>
+          </a:solidFill>
+          <a:ln>
+            <a:noFill/>
+          </a:ln>
+          <a:effectLst>
+            <a:outerShdw blurRad="139700" dist="127000" dir="5400000" algn="t" rotWithShape="0">
+              <a:prstClr val="black">
+                <a:alpha val="15000"/>
+              </a:prstClr>
+            </a:outerShdw>
+          </a:effectLst>
+        </p:spPr>
+        <p:style>
+          <a:lnRef idx="2">
+            <a:schemeClr val="accent1">
+              <a:shade val="50000"/>
+            </a:schemeClr>
+          </a:lnRef>
+          <a:fillRef idx="1">
+            <a:schemeClr val="accent1"/>
+          </a:fillRef>
+          <a:effectRef idx="0">
+            <a:schemeClr val="accent1"/>
+          </a:effectRef>
+          <a:fontRef idx="minor">
+            <a:schemeClr val="lt1"/>
+          </a:fontRef>
+        </p:style>
+        <p:txBody>
+          <a:bodyPr rtlCol="0" anchor="ctr"/>
+          <a:lstStyle/>
+          <a:p>
+            <a:pPr algn="ctr"/>
+            <a:endParaRPr lang="en-US"/>
+          </a:p>
+        </p:txBody>
+      </p:sp>
+      <p:sp>
+        <p:nvSpPr>
+          <p:cNvPr id="4" name="Rectangle 1">
+            <a:extLst>
+              <a:ext uri="{FF2B5EF4-FFF2-40B4-BE49-F238E27FC236}">
+                <a16:creationId xmlns:a16="http://schemas.microsoft.com/office/drawing/2014/main" id="{763D8177-01E0-0BB0-1A9E-905C24550DEC}"/>
+              </a:ext>
+            </a:extLst>
+          </p:cNvPr>
+          <p:cNvSpPr>
+            <a:spLocks noGrp="1" noChangeArrowheads="1"/>
+          </p:cNvSpPr>
+          <p:nvPr>
+            <p:ph idx="1"/>
+          </p:nvPr>
+        </p:nvSpPr>
+        <p:spPr bwMode="auto">
+          <a:xfrm>
+            <a:off x="793661" y="2599509"/>
+            <a:ext cx="4530898" cy="3639450"/>
+          </a:xfrm>
+          <a:prstGeom prst="rect">
+            <a:avLst/>
+          </a:prstGeom>
+          <a:extLst>
+            <a:ext uri="{909E8E84-426E-40DD-AFC4-6F175D3DCCD1}">
+              <a14:hiddenFill xmlns:a14="http://schemas.microsoft.com/office/drawing/2010/main">
+                <a:solidFill>
+                  <a:schemeClr val="accent1"/>
+                </a:solidFill>
+              </a14:hiddenFill>
+            </a:ext>
+            <a:ext uri="{91240B29-F687-4F45-9708-019B960494DF}">
+              <a14:hiddenLine xmlns:a14="http://schemas.microsoft.com/office/drawing/2010/main" w="9525">
+                <a:solidFill>
+                  <a:schemeClr val="tx1"/>
+                </a:solidFill>
+                <a:miter lim="800000"/>
+                <a:headEnd/>
+                <a:tailEnd/>
+              </a14:hiddenLine>
+            </a:ext>
+            <a:ext uri="{AF507438-7753-43E0-B8FC-AC1667EBCBE1}">
+              <a14:hiddenEffects xmlns:a14="http://schemas.microsoft.com/office/drawing/2010/main">
+                <a:effectLst>
+                  <a:outerShdw dist="35921" dir="2700000" algn="ctr" rotWithShape="0">
+                    <a:schemeClr val="bg2"/>
+                  </a:outerShdw>
+                </a:effectLst>
+              </a14:hiddenEffects>
+            </a:ext>
+          </a:extLst>
+        </p:spPr>
+        <p:txBody>
+          <a:bodyPr vert="horz" lIns="91440" tIns="45720" rIns="91440" bIns="45720" numCol="1" anchor="ctr" anchorCtr="0" compatLnSpc="1">
+            <a:prstTxWarp prst="textNoShape">
+              <a:avLst/>
+            </a:prstTxWarp>
+            <a:normAutofit/>
+          </a:bodyPr>
+          <a:lstStyle/>
+          <a:p>
+            <a:pPr marL="0" marR="0" lvl="0" indent="0" defTabSz="914400" rtl="0" eaLnBrk="0" fontAlgn="base" latinLnBrk="0" hangingPunct="0">
+              <a:spcBef>
+                <a:spcPct val="0"/>
+              </a:spcBef>
+              <a:spcAft>
+                <a:spcPts val="600"/>
+              </a:spcAft>
+              <a:buClrTx/>
+              <a:buSzTx/>
+              <a:buNone/>
+              <a:tabLst/>
+            </a:pPr>
+            <a:r>
+              <a:rPr kumimoji="0" lang="en-CH" altLang="en-CH" sz="2000" b="0" i="0" u="none" strike="noStrike" cap="none" normalizeH="0" baseline="0">
+                <a:ln>
+                  <a:noFill/>
+                </a:ln>
+                <a:effectLst/>
+                <a:latin typeface="Arial" panose="020B0604020202020204" pitchFamily="34" charset="0"/>
+              </a:rPr>
+              <a:t>Piattaforma per gestire repository Git</a:t>
+            </a:r>
+          </a:p>
+          <a:p>
+            <a:pPr marL="0" marR="0" lvl="0" indent="0" defTabSz="914400" rtl="0" eaLnBrk="0" fontAlgn="base" latinLnBrk="0" hangingPunct="0">
+              <a:spcBef>
+                <a:spcPct val="0"/>
+              </a:spcBef>
+              <a:spcAft>
+                <a:spcPts val="600"/>
+              </a:spcAft>
+              <a:buClrTx/>
+              <a:buSzTx/>
+              <a:buNone/>
+              <a:tabLst/>
+            </a:pPr>
+            <a:r>
+              <a:rPr kumimoji="0" lang="en-CH" altLang="en-CH" sz="2000" b="0" i="0" u="none" strike="noStrike" cap="none" normalizeH="0" baseline="0">
+                <a:ln>
+                  <a:noFill/>
+                </a:ln>
+                <a:effectLst/>
+                <a:latin typeface="Arial" panose="020B0604020202020204" pitchFamily="34" charset="0"/>
+              </a:rPr>
+              <a:t>Integrazione stretta con gli strumenti Atlassian </a:t>
+            </a:r>
+            <a:endParaRPr kumimoji="0" lang="fr-FR" altLang="en-CH" sz="2000" b="0" i="0" u="none" strike="noStrike" cap="none" normalizeH="0" baseline="0">
+              <a:ln>
+                <a:noFill/>
+              </a:ln>
+              <a:effectLst/>
+              <a:latin typeface="Arial" panose="020B0604020202020204" pitchFamily="34" charset="0"/>
+            </a:endParaRPr>
+          </a:p>
+          <a:p>
+            <a:pPr marL="0" marR="0" lvl="0" indent="0" defTabSz="914400" rtl="0" eaLnBrk="0" fontAlgn="base" latinLnBrk="0" hangingPunct="0">
+              <a:spcBef>
+                <a:spcPct val="0"/>
+              </a:spcBef>
+              <a:spcAft>
+                <a:spcPts val="600"/>
+              </a:spcAft>
+              <a:buClrTx/>
+              <a:buSzTx/>
+              <a:buNone/>
+              <a:tabLst/>
+            </a:pPr>
+            <a:r>
+              <a:rPr kumimoji="0" lang="en-CH" altLang="en-CH" sz="2000" b="0" i="0" u="none" strike="noStrike" cap="none" normalizeH="0" baseline="0">
+                <a:ln>
+                  <a:noFill/>
+                </a:ln>
+                <a:effectLst/>
+                <a:latin typeface="Arial" panose="020B0604020202020204" pitchFamily="34" charset="0"/>
+              </a:rPr>
+              <a:t>Adatto a team che già usano Atlassian.</a:t>
+            </a:r>
+          </a:p>
+          <a:p>
+            <a:pPr marL="0" marR="0" lvl="0" indent="0" defTabSz="914400" rtl="0" eaLnBrk="0" fontAlgn="base" latinLnBrk="0" hangingPunct="0">
+              <a:spcBef>
+                <a:spcPct val="0"/>
+              </a:spcBef>
+              <a:spcAft>
+                <a:spcPts val="600"/>
+              </a:spcAft>
+              <a:buClrTx/>
+              <a:buSzTx/>
+              <a:buNone/>
+              <a:tabLst/>
+            </a:pPr>
+            <a:r>
+              <a:rPr kumimoji="0" lang="en-CH" altLang="en-CH" sz="2000" b="0" i="0" u="none" strike="noStrike" cap="none" normalizeH="0" baseline="0">
+                <a:ln>
+                  <a:noFill/>
+                </a:ln>
+                <a:effectLst/>
+                <a:latin typeface="Arial" panose="020B0604020202020204" pitchFamily="34" charset="0"/>
+              </a:rPr>
+              <a:t>Disponibile sia in versione </a:t>
+            </a:r>
+            <a:r>
+              <a:rPr kumimoji="0" lang="en-CH" altLang="en-CH" sz="2000" i="0" u="none" strike="noStrike" cap="none" normalizeH="0" baseline="0">
+                <a:ln>
+                  <a:noFill/>
+                </a:ln>
+                <a:effectLst/>
+                <a:latin typeface="Arial" panose="020B0604020202020204" pitchFamily="34" charset="0"/>
+              </a:rPr>
+              <a:t>cloud che self-hosted</a:t>
+            </a:r>
+            <a:endParaRPr kumimoji="0" lang="en-CH" altLang="en-CH" sz="2000" b="0" i="0" u="none" strike="noStrike" cap="none" normalizeH="0" baseline="0">
+              <a:ln>
+                <a:noFill/>
+              </a:ln>
+              <a:effectLst/>
+              <a:latin typeface="Arial" panose="020B0604020202020204" pitchFamily="34" charset="0"/>
+            </a:endParaRPr>
+          </a:p>
+        </p:txBody>
+      </p:sp>
+      <p:pic>
+        <p:nvPicPr>
+          <p:cNvPr id="5" name="Image 4" descr="Une image contenant Police, Graphique, capture d’écran, graphisme&#10;&#10;Le contenu généré par l’IA peut être incorrect.">
+            <a:extLst>
+              <a:ext uri="{FF2B5EF4-FFF2-40B4-BE49-F238E27FC236}">
+                <a16:creationId xmlns:a16="http://schemas.microsoft.com/office/drawing/2014/main" id="{21E697D6-A7B6-9B55-B9D4-90DC9665038D}"/>
+              </a:ext>
+            </a:extLst>
+          </p:cNvPr>
+          <p:cNvPicPr>
+            <a:picLocks noChangeAspect="1"/>
+          </p:cNvPicPr>
+          <p:nvPr/>
+        </p:nvPicPr>
+        <p:blipFill>
+          <a:blip r:embed="rId3"/>
+          <a:stretch>
+            <a:fillRect/>
+          </a:stretch>
+        </p:blipFill>
+        <p:spPr>
+          <a:xfrm>
+            <a:off x="5911532" y="4006609"/>
+            <a:ext cx="5150277" cy="669535"/>
+          </a:xfrm>
+          <a:prstGeom prst="rect">
+            <a:avLst/>
+          </a:prstGeom>
+        </p:spPr>
+      </p:pic>
+      <p:sp>
+        <p:nvSpPr>
+          <p:cNvPr id="16" name="Rectangle 15">
+            <a:extLst>
+              <a:ext uri="{FF2B5EF4-FFF2-40B4-BE49-F238E27FC236}">
+                <a16:creationId xmlns:a16="http://schemas.microsoft.com/office/drawing/2014/main" id="{E6995CE5-F890-4ABA-82A2-26507CE8D2A3}"/>
+              </a:ext>
+              <a:ext uri="{C183D7F6-B498-43B3-948B-1728B52AA6E4}">
+                <adec:decorative xmlns:adec="http://schemas.microsoft.com/office/drawing/2017/decorative" val="1"/>
+              </a:ext>
+            </a:extLst>
+          </p:cNvPr>
+          <p:cNvSpPr>
+            <a:spLocks noGrp="1" noRot="1" noChangeAspect="1" noMove="1" noResize="1" noEditPoints="1" noAdjustHandles="1" noChangeArrowheads="1" noChangeShapeType="1" noTextEdit="1"/>
+          </p:cNvSpPr>
+          <p:nvPr>
+            <p:extLst>
+              <p:ext uri="{386F3935-93C4-4BCD-93E2-E3B085C9AB24}">
+                <p16:designElem xmlns:p16="http://schemas.microsoft.com/office/powerpoint/2015/main" val="1"/>
+              </p:ext>
+            </p:extLst>
+          </p:nvPr>
+        </p:nvSpPr>
+        <p:spPr>
+          <a:xfrm rot="5400000">
+            <a:off x="11228040" y="2313027"/>
+            <a:ext cx="781700" cy="152382"/>
+          </a:xfrm>
+          <a:prstGeom prst="rect">
+            <a:avLst/>
+          </a:prstGeom>
+          <a:solidFill>
+            <a:schemeClr val="accent4"/>
+          </a:solidFill>
+          <a:ln>
+            <a:noFill/>
+          </a:ln>
+        </p:spPr>
+        <p:style>
+          <a:lnRef idx="2">
+            <a:schemeClr val="accent1">
+              <a:shade val="50000"/>
+            </a:schemeClr>
+          </a:lnRef>
+          <a:fillRef idx="1">
+            <a:schemeClr val="accent1"/>
+          </a:fillRef>
+          <a:effectRef idx="0">
+            <a:schemeClr val="accent1"/>
+          </a:effectRef>
+          <a:fontRef idx="minor">
+            <a:schemeClr val="lt1"/>
+          </a:fontRef>
+        </p:style>
+        <p:txBody>
+          <a:bodyPr rtlCol="0" anchor="ctr"/>
+          <a:lstStyle/>
+          <a:p>
+            <a:pPr algn="ctr"/>
+            <a:endParaRPr lang="en-US"/>
+          </a:p>
+        </p:txBody>
+      </p:sp>
+    </p:spTree>
+    <p:extLst>
+      <p:ext uri="{BB962C8B-B14F-4D97-AF65-F5344CB8AC3E}">
+        <p14:creationId xmlns:p14="http://schemas.microsoft.com/office/powerpoint/2010/main" val="2672056225"/>
+      </p:ext>
+    </p:extLst>
+  </p:cSld>
+  <p:clrMapOvr>
+    <a:masterClrMapping/>
+  </p:clrMapOvr>
+  <p:extLst>
+    <p:ext uri="{6950BFC3-D8DA-4A85-94F7-54DA5524770B}">
+      <p188:commentRel xmlns:p188="http://schemas.microsoft.com/office/powerpoint/2018/8/main" r:id="rId2"/>
+    </p:ext>
+  </p:extLst>
 </p:sld>
 </file>
 
@@ -8332,4 +11009,319 @@
     </a:ext>
   </a:extLst>
 </a:theme>
+</file>
+
+<file path=ppt/theme/theme2.xml><?xml version="1.0" encoding="utf-8"?>
+<a:theme xmlns:a="http://schemas.openxmlformats.org/drawingml/2006/main" name="Thème Office">
+  <a:themeElements>
+    <a:clrScheme name="Office">
+      <a:dk1>
+        <a:sysClr val="windowText" lastClr="000000"/>
+      </a:dk1>
+      <a:lt1>
+        <a:sysClr val="window" lastClr="FFFFFF"/>
+      </a:lt1>
+      <a:dk2>
+        <a:srgbClr val="0E2841"/>
+      </a:dk2>
+      <a:lt2>
+        <a:srgbClr val="E8E8E8"/>
+      </a:lt2>
+      <a:accent1>
+        <a:srgbClr val="156082"/>
+      </a:accent1>
+      <a:accent2>
+        <a:srgbClr val="E97132"/>
+      </a:accent2>
+      <a:accent3>
+        <a:srgbClr val="196B24"/>
+      </a:accent3>
+      <a:accent4>
+        <a:srgbClr val="0F9ED5"/>
+      </a:accent4>
+      <a:accent5>
+        <a:srgbClr val="A02B93"/>
+      </a:accent5>
+      <a:accent6>
+        <a:srgbClr val="4EA72E"/>
+      </a:accent6>
+      <a:hlink>
+        <a:srgbClr val="467886"/>
+      </a:hlink>
+      <a:folHlink>
+        <a:srgbClr val="96607D"/>
+      </a:folHlink>
+    </a:clrScheme>
+    <a:fontScheme name="Office">
+      <a:majorFont>
+        <a:latin typeface="Aptos Display" panose="02110004020202020204"/>
+        <a:ea typeface=""/>
+        <a:cs typeface=""/>
+        <a:font script="Jpan" typeface="游ゴシック Light"/>
+        <a:font script="Hang" typeface="맑은 고딕"/>
+        <a:font script="Hans" typeface="等线 Light"/>
+        <a:font script="Hant" typeface="新細明體"/>
+        <a:font script="Arab" typeface="Times New Roman"/>
+        <a:font script="Hebr" typeface="Times New Roman"/>
+        <a:font script="Thai" typeface="Angsana New"/>
+        <a:font script="Ethi" typeface="Nyala"/>
+        <a:font script="Beng" typeface="Vrinda"/>
+        <a:font script="Gujr" typeface="Shruti"/>
+        <a:font script="Khmr" typeface="MoolBoran"/>
+        <a:font script="Knda" typeface="Tunga"/>
+        <a:font script="Guru" typeface="Raavi"/>
+        <a:font script="Cans" typeface="Euphemia"/>
+        <a:font script="Cher" typeface="Plantagenet Cherokee"/>
+        <a:font script="Yiii" typeface="Microsoft Yi Baiti"/>
+        <a:font script="Tibt" typeface="Microsoft Himalaya"/>
+        <a:font script="Thaa" typeface="MV Boli"/>
+        <a:font script="Deva" typeface="Mangal"/>
+        <a:font script="Telu" typeface="Gautami"/>
+        <a:font script="Taml" typeface="Latha"/>
+        <a:font script="Syrc" typeface="Estrangelo Edessa"/>
+        <a:font script="Orya" typeface="Kalinga"/>
+        <a:font script="Mlym" typeface="Kartika"/>
+        <a:font script="Laoo" typeface="DokChampa"/>
+        <a:font script="Sinh" typeface="Iskoola Pota"/>
+        <a:font script="Mong" typeface="Mongolian Baiti"/>
+        <a:font script="Viet" typeface="Times New Roman"/>
+        <a:font script="Uigh" typeface="Microsoft Uighur"/>
+        <a:font script="Geor" typeface="Sylfaen"/>
+        <a:font script="Armn" typeface="Arial"/>
+        <a:font script="Bugi" typeface="Leelawadee UI"/>
+        <a:font script="Bopo" typeface="Microsoft JhengHei"/>
+        <a:font script="Java" typeface="Javanese Text"/>
+        <a:font script="Lisu" typeface="Segoe UI"/>
+        <a:font script="Mymr" typeface="Myanmar Text"/>
+        <a:font script="Nkoo" typeface="Ebrima"/>
+        <a:font script="Olck" typeface="Nirmala UI"/>
+        <a:font script="Osma" typeface="Ebrima"/>
+        <a:font script="Phag" typeface="Phagspa"/>
+        <a:font script="Syrn" typeface="Estrangelo Edessa"/>
+        <a:font script="Syrj" typeface="Estrangelo Edessa"/>
+        <a:font script="Syre" typeface="Estrangelo Edessa"/>
+        <a:font script="Sora" typeface="Nirmala UI"/>
+        <a:font script="Tale" typeface="Microsoft Tai Le"/>
+        <a:font script="Talu" typeface="Microsoft New Tai Lue"/>
+        <a:font script="Tfng" typeface="Ebrima"/>
+      </a:majorFont>
+      <a:minorFont>
+        <a:latin typeface="Aptos" panose="02110004020202020204"/>
+        <a:ea typeface=""/>
+        <a:cs typeface=""/>
+        <a:font script="Jpan" typeface="游ゴシック"/>
+        <a:font script="Hang" typeface="맑은 고딕"/>
+        <a:font script="Hans" typeface="等线"/>
+        <a:font script="Hant" typeface="新細明體"/>
+        <a:font script="Arab" typeface="Arial"/>
+        <a:font script="Hebr" typeface="Arial"/>
+        <a:font script="Thai" typeface="Cordia New"/>
+        <a:font script="Ethi" typeface="Nyala"/>
+        <a:font script="Beng" typeface="Vrinda"/>
+        <a:font script="Gujr" typeface="Shruti"/>
+        <a:font script="Khmr" typeface="DaunPenh"/>
+        <a:font script="Knda" typeface="Tunga"/>
+        <a:font script="Guru" typeface="Raavi"/>
+        <a:font script="Cans" typeface="Euphemia"/>
+        <a:font script="Cher" typeface="Plantagenet Cherokee"/>
+        <a:font script="Yiii" typeface="Microsoft Yi Baiti"/>
+        <a:font script="Tibt" typeface="Microsoft Himalaya"/>
+        <a:font script="Thaa" typeface="MV Boli"/>
+        <a:font script="Deva" typeface="Mangal"/>
+        <a:font script="Telu" typeface="Gautami"/>
+        <a:font script="Taml" typeface="Latha"/>
+        <a:font script="Syrc" typeface="Estrangelo Edessa"/>
+        <a:font script="Orya" typeface="Kalinga"/>
+        <a:font script="Mlym" typeface="Kartika"/>
+        <a:font script="Laoo" typeface="DokChampa"/>
+        <a:font script="Sinh" typeface="Iskoola Pota"/>
+        <a:font script="Mong" typeface="Mongolian Baiti"/>
+        <a:font script="Viet" typeface="Arial"/>
+        <a:font script="Uigh" typeface="Microsoft Uighur"/>
+        <a:font script="Geor" typeface="Sylfaen"/>
+        <a:font script="Armn" typeface="Arial"/>
+        <a:font script="Bugi" typeface="Leelawadee UI"/>
+        <a:font script="Bopo" typeface="Microsoft JhengHei"/>
+        <a:font script="Java" typeface="Javanese Text"/>
+        <a:font script="Lisu" typeface="Segoe UI"/>
+        <a:font script="Mymr" typeface="Myanmar Text"/>
+        <a:font script="Nkoo" typeface="Ebrima"/>
+        <a:font script="Olck" typeface="Nirmala UI"/>
+        <a:font script="Osma" typeface="Ebrima"/>
+        <a:font script="Phag" typeface="Phagspa"/>
+        <a:font script="Syrn" typeface="Estrangelo Edessa"/>
+        <a:font script="Syrj" typeface="Estrangelo Edessa"/>
+        <a:font script="Syre" typeface="Estrangelo Edessa"/>
+        <a:font script="Sora" typeface="Nirmala UI"/>
+        <a:font script="Tale" typeface="Microsoft Tai Le"/>
+        <a:font script="Talu" typeface="Microsoft New Tai Lue"/>
+        <a:font script="Tfng" typeface="Ebrima"/>
+      </a:minorFont>
+    </a:fontScheme>
+    <a:fmtScheme name="Office">
+      <a:fillStyleLst>
+        <a:solidFill>
+          <a:schemeClr val="phClr"/>
+        </a:solidFill>
+        <a:gradFill rotWithShape="1">
+          <a:gsLst>
+            <a:gs pos="0">
+              <a:schemeClr val="phClr">
+                <a:lumMod val="110000"/>
+                <a:satMod val="105000"/>
+                <a:tint val="67000"/>
+              </a:schemeClr>
+            </a:gs>
+            <a:gs pos="50000">
+              <a:schemeClr val="phClr">
+                <a:lumMod val="105000"/>
+                <a:satMod val="103000"/>
+                <a:tint val="73000"/>
+              </a:schemeClr>
+            </a:gs>
+            <a:gs pos="100000">
+              <a:schemeClr val="phClr">
+                <a:lumMod val="105000"/>
+                <a:satMod val="109000"/>
+                <a:tint val="81000"/>
+              </a:schemeClr>
+            </a:gs>
+          </a:gsLst>
+          <a:lin ang="5400000" scaled="0"/>
+        </a:gradFill>
+        <a:gradFill rotWithShape="1">
+          <a:gsLst>
+            <a:gs pos="0">
+              <a:schemeClr val="phClr">
+                <a:satMod val="103000"/>
+                <a:lumMod val="102000"/>
+                <a:tint val="94000"/>
+              </a:schemeClr>
+            </a:gs>
+            <a:gs pos="50000">
+              <a:schemeClr val="phClr">
+                <a:satMod val="110000"/>
+                <a:lumMod val="100000"/>
+                <a:shade val="100000"/>
+              </a:schemeClr>
+            </a:gs>
+            <a:gs pos="100000">
+              <a:schemeClr val="phClr">
+                <a:lumMod val="99000"/>
+                <a:satMod val="120000"/>
+                <a:shade val="78000"/>
+              </a:schemeClr>
+            </a:gs>
+          </a:gsLst>
+          <a:lin ang="5400000" scaled="0"/>
+        </a:gradFill>
+      </a:fillStyleLst>
+      <a:lnStyleLst>
+        <a:ln w="12700" cap="flat" cmpd="sng" algn="ctr">
+          <a:solidFill>
+            <a:schemeClr val="phClr"/>
+          </a:solidFill>
+          <a:prstDash val="solid"/>
+          <a:miter lim="800000"/>
+        </a:ln>
+        <a:ln w="19050" cap="flat" cmpd="sng" algn="ctr">
+          <a:solidFill>
+            <a:schemeClr val="phClr"/>
+          </a:solidFill>
+          <a:prstDash val="solid"/>
+          <a:miter lim="800000"/>
+        </a:ln>
+        <a:ln w="25400" cap="flat" cmpd="sng" algn="ctr">
+          <a:solidFill>
+            <a:schemeClr val="phClr"/>
+          </a:solidFill>
+          <a:prstDash val="solid"/>
+          <a:miter lim="800000"/>
+        </a:ln>
+      </a:lnStyleLst>
+      <a:effectStyleLst>
+        <a:effectStyle>
+          <a:effectLst/>
+        </a:effectStyle>
+        <a:effectStyle>
+          <a:effectLst/>
+        </a:effectStyle>
+        <a:effectStyle>
+          <a:effectLst>
+            <a:outerShdw blurRad="57150" dist="19050" dir="5400000" algn="ctr" rotWithShape="0">
+              <a:srgbClr val="000000">
+                <a:alpha val="63000"/>
+              </a:srgbClr>
+            </a:outerShdw>
+          </a:effectLst>
+        </a:effectStyle>
+      </a:effectStyleLst>
+      <a:bgFillStyleLst>
+        <a:solidFill>
+          <a:schemeClr val="phClr"/>
+        </a:solidFill>
+        <a:solidFill>
+          <a:schemeClr val="phClr">
+            <a:tint val="95000"/>
+            <a:satMod val="170000"/>
+          </a:schemeClr>
+        </a:solidFill>
+        <a:gradFill rotWithShape="1">
+          <a:gsLst>
+            <a:gs pos="0">
+              <a:schemeClr val="phClr">
+                <a:tint val="93000"/>
+                <a:satMod val="150000"/>
+                <a:shade val="98000"/>
+                <a:lumMod val="102000"/>
+              </a:schemeClr>
+            </a:gs>
+            <a:gs pos="50000">
+              <a:schemeClr val="phClr">
+                <a:tint val="98000"/>
+                <a:satMod val="130000"/>
+                <a:shade val="90000"/>
+                <a:lumMod val="103000"/>
+              </a:schemeClr>
+            </a:gs>
+            <a:gs pos="100000">
+              <a:schemeClr val="phClr">
+                <a:shade val="63000"/>
+                <a:satMod val="120000"/>
+              </a:schemeClr>
+            </a:gs>
+          </a:gsLst>
+          <a:lin ang="5400000" scaled="0"/>
+        </a:gradFill>
+      </a:bgFillStyleLst>
+    </a:fmtScheme>
+  </a:themeElements>
+  <a:objectDefaults>
+    <a:lnDef>
+      <a:spPr/>
+      <a:bodyPr/>
+      <a:lstStyle/>
+      <a:style>
+        <a:lnRef idx="2">
+          <a:schemeClr val="accent1"/>
+        </a:lnRef>
+        <a:fillRef idx="0">
+          <a:schemeClr val="accent1"/>
+        </a:fillRef>
+        <a:effectRef idx="1">
+          <a:schemeClr val="accent1"/>
+        </a:effectRef>
+        <a:fontRef idx="minor">
+          <a:schemeClr val="tx1"/>
+        </a:fontRef>
+      </a:style>
+    </a:lnDef>
+  </a:objectDefaults>
+  <a:extraClrSchemeLst/>
+  <a:extLst>
+    <a:ext uri="{05A4C25C-085E-4340-85A3-A5531E510DB2}">
+      <thm15:themeFamily xmlns:thm15="http://schemas.microsoft.com/office/thememl/2012/main" name="Office Theme" id="{2E142A2C-CD16-42D6-873A-C26D2A0506FA}" vid="{1BDDFF52-6CD6-40A5-AB3C-68EB2F1E4D0A}"/>
+    </a:ext>
+  </a:extLst>
+</a:theme>
 </file>
</xml_diff>